<commit_message>
Added Lambda Lounge 2014 project
</commit_message>
<xml_diff>
--- a/FunctionalProgrammingForJavaDevelopers/ppt/Functional Programming for Object-Oriented Developers.pptx
+++ b/FunctionalProgrammingForJavaDevelopers/ppt/Functional Programming for Object-Oriented Developers.pptx
@@ -17,8 +17,9 @@
     <p:sldId id="267" r:id="rId11"/>
     <p:sldId id="266" r:id="rId12"/>
     <p:sldId id="268" r:id="rId13"/>
-    <p:sldId id="257" r:id="rId14"/>
-    <p:sldId id="269" r:id="rId15"/>
+    <p:sldId id="270" r:id="rId14"/>
+    <p:sldId id="257" r:id="rId15"/>
+    <p:sldId id="269" r:id="rId16"/>
   </p:sldIdLst>
   <p:sldSz cx="12192000" cy="6858000"/>
   <p:notesSz cx="6858000" cy="9144000"/>
@@ -6492,7 +6493,7 @@
           <a:p>
             <a:r>
               <a:rPr lang="en-US" baseline="0" dirty="0" smtClean="0"/>
-              <a:t>Visitor pattern</a:t>
+              <a:t>Visitor/Iterator pattern</a:t>
             </a:r>
             <a:endParaRPr lang="en-US" dirty="0"/>
           </a:p>
@@ -6545,6 +6546,96 @@
           <a:p>
             <a:r>
               <a:rPr lang="en-US" dirty="0" smtClean="0"/>
+              <a:t>Separate data from functions</a:t>
+            </a:r>
+            <a:endParaRPr lang="en-US" dirty="0"/>
+          </a:p>
+        </p:txBody>
+      </p:sp>
+      <p:sp>
+        <p:nvSpPr>
+          <p:cNvPr id="3" name="Content Placeholder 2"/>
+          <p:cNvSpPr>
+            <a:spLocks noGrp="1"/>
+          </p:cNvSpPr>
+          <p:nvPr>
+            <p:ph idx="1"/>
+          </p:nvPr>
+        </p:nvSpPr>
+        <p:spPr/>
+        <p:txBody>
+          <a:bodyPr/>
+          <a:lstStyle/>
+          <a:p>
+            <a:r>
+              <a:rPr lang="en-US" dirty="0" smtClean="0"/>
+              <a:t>Forget “Objects</a:t>
+            </a:r>
+            <a:r>
+              <a:rPr lang="en-US" baseline="0" dirty="0" smtClean="0"/>
+              <a:t> should be able …”</a:t>
+            </a:r>
+          </a:p>
+          <a:p>
+            <a:r>
+              <a:rPr lang="en-US" dirty="0" smtClean="0"/>
+              <a:t>Use Strategy pattern to define algorithms outside</a:t>
+            </a:r>
+            <a:r>
+              <a:rPr lang="en-US" baseline="0" dirty="0" smtClean="0"/>
+              <a:t> the values they work on</a:t>
+            </a:r>
+            <a:endParaRPr lang="en-US" dirty="0"/>
+          </a:p>
+        </p:txBody>
+      </p:sp>
+    </p:spTree>
+    <p:extLst>
+      <p:ext uri="{BB962C8B-B14F-4D97-AF65-F5344CB8AC3E}">
+        <p14:creationId xmlns:p14="http://schemas.microsoft.com/office/powerpoint/2010/main" val="64466811"/>
+      </p:ext>
+    </p:extLst>
+  </p:cSld>
+  <p:clrMapOvr>
+    <a:masterClrMapping/>
+  </p:clrMapOvr>
+</p:sld>
+</file>
+
+<file path=ppt/slides/slide14.xml><?xml version="1.0" encoding="utf-8"?>
+<p:sld xmlns:a="http://schemas.openxmlformats.org/drawingml/2006/main" xmlns:r="http://schemas.openxmlformats.org/officeDocument/2006/relationships" xmlns:p="http://schemas.openxmlformats.org/presentationml/2006/main">
+  <p:cSld>
+    <p:spTree>
+      <p:nvGrpSpPr>
+        <p:cNvPr id="1" name=""/>
+        <p:cNvGrpSpPr/>
+        <p:nvPr/>
+      </p:nvGrpSpPr>
+      <p:grpSpPr>
+        <a:xfrm>
+          <a:off x="0" y="0"/>
+          <a:ext cx="0" cy="0"/>
+          <a:chOff x="0" y="0"/>
+          <a:chExt cx="0" cy="0"/>
+        </a:xfrm>
+      </p:grpSpPr>
+      <p:sp>
+        <p:nvSpPr>
+          <p:cNvPr id="2" name="Title 1"/>
+          <p:cNvSpPr>
+            <a:spLocks noGrp="1"/>
+          </p:cNvSpPr>
+          <p:nvPr>
+            <p:ph type="title"/>
+          </p:nvPr>
+        </p:nvSpPr>
+        <p:spPr/>
+        <p:txBody>
+          <a:bodyPr/>
+          <a:lstStyle/>
+          <a:p>
+            <a:r>
+              <a:rPr lang="en-US" dirty="0" smtClean="0"/>
               <a:t>Demo – </a:t>
             </a:r>
             <a:r>
@@ -6574,6 +6665,62 @@
               <a:rPr lang="en-US" dirty="0" smtClean="0"/>
               <a:t>Value</a:t>
             </a:r>
+          </a:p>
+          <a:p>
+            <a:r>
+              <a:rPr lang="en-US" dirty="0" smtClean="0"/>
+              <a:t>predicates</a:t>
+            </a:r>
+            <a:r>
+              <a:rPr lang="en-US" baseline="0" dirty="0" smtClean="0"/>
+              <a:t> – before, after – code to interface Comparable</a:t>
+            </a:r>
+          </a:p>
+          <a:p>
+            <a:pPr lvl="1"/>
+            <a:r>
+              <a:rPr lang="en-US" baseline="0" dirty="0" smtClean="0"/>
+              <a:t>Could be reused with all </a:t>
+            </a:r>
+            <a:r>
+              <a:rPr lang="en-US" baseline="0" dirty="0" err="1" smtClean="0"/>
+              <a:t>Comparables</a:t>
+            </a:r>
+            <a:endParaRPr lang="en-US" baseline="0" dirty="0" smtClean="0"/>
+          </a:p>
+          <a:p>
+            <a:r>
+              <a:rPr lang="en-US" dirty="0" smtClean="0"/>
+              <a:t>giving meaning -</a:t>
+            </a:r>
+            <a:r>
+              <a:rPr lang="en-US" baseline="0" dirty="0" smtClean="0"/>
+              <a:t> </a:t>
+            </a:r>
+            <a:r>
+              <a:rPr lang="en-US" dirty="0" smtClean="0"/>
+              <a:t>calendar – parse,</a:t>
+            </a:r>
+            <a:r>
+              <a:rPr lang="en-US" baseline="0" dirty="0" smtClean="0"/>
+              <a:t> format – strategy: value =&gt; value</a:t>
+            </a:r>
+          </a:p>
+          <a:p>
+            <a:pPr lvl="1"/>
+            <a:r>
+              <a:rPr lang="en-US" dirty="0" smtClean="0"/>
+              <a:t>Gregorian, Chinese, Hebrew, </a:t>
+            </a:r>
+            <a:r>
+              <a:rPr lang="en-US" dirty="0" err="1" smtClean="0"/>
+              <a:t>etc</a:t>
+            </a:r>
+            <a:endParaRPr lang="en-US" dirty="0" smtClean="0"/>
+          </a:p>
+          <a:p>
+            <a:pPr lvl="0"/>
+            <a:endParaRPr lang="en-US" dirty="0" smtClean="0"/>
           </a:p>
         </p:txBody>
       </p:sp>
@@ -6590,7 +6737,7 @@
 </p:sld>
 </file>
 
-<file path=ppt/slides/slide14.xml><?xml version="1.0" encoding="utf-8"?>
+<file path=ppt/slides/slide15.xml><?xml version="1.0" encoding="utf-8"?>
 <p:sld xmlns:a="http://schemas.openxmlformats.org/drawingml/2006/main" xmlns:r="http://schemas.openxmlformats.org/officeDocument/2006/relationships" xmlns:p="http://schemas.openxmlformats.org/presentationml/2006/main">
   <p:cSld>
     <p:spTree>
@@ -7790,6 +7937,12 @@
             <a:r>
               <a:rPr lang="en-US" baseline="0" dirty="0" smtClean="0"/>
               <a:t>Treating all inputs and outputs as values</a:t>
+            </a:r>
+          </a:p>
+          <a:p>
+            <a:r>
+              <a:rPr lang="en-US" baseline="0" dirty="0" smtClean="0"/>
+              <a:t>Separate data from functions</a:t>
             </a:r>
           </a:p>
         </p:txBody>

</xml_diff>

<commit_message>
Added page on immutablility
</commit_message>
<xml_diff>
--- a/FunctionalProgrammingForJavaDevelopers/ppt/Functional Programming for Object-Oriented Developers.pptx
+++ b/FunctionalProgrammingForJavaDevelopers/ppt/Functional Programming for Object-Oriented Developers.pptx
@@ -5,7 +5,7 @@
     <p:sldMasterId id="2147483648" r:id="rId1"/>
   </p:sldMasterIdLst>
   <p:notesMasterIdLst>
-    <p:notesMasterId r:id="rId20"/>
+    <p:notesMasterId r:id="rId21"/>
   </p:notesMasterIdLst>
   <p:sldIdLst>
     <p:sldId id="256" r:id="rId2"/>
@@ -16,16 +16,17 @@
     <p:sldId id="261" r:id="rId7"/>
     <p:sldId id="264" r:id="rId8"/>
     <p:sldId id="265" r:id="rId9"/>
-    <p:sldId id="262" r:id="rId10"/>
-    <p:sldId id="263" r:id="rId11"/>
-    <p:sldId id="267" r:id="rId12"/>
-    <p:sldId id="266" r:id="rId13"/>
-    <p:sldId id="268" r:id="rId14"/>
-    <p:sldId id="270" r:id="rId15"/>
-    <p:sldId id="272" r:id="rId16"/>
-    <p:sldId id="271" r:id="rId17"/>
-    <p:sldId id="257" r:id="rId18"/>
-    <p:sldId id="269" r:id="rId19"/>
+    <p:sldId id="274" r:id="rId10"/>
+    <p:sldId id="262" r:id="rId11"/>
+    <p:sldId id="263" r:id="rId12"/>
+    <p:sldId id="267" r:id="rId13"/>
+    <p:sldId id="266" r:id="rId14"/>
+    <p:sldId id="268" r:id="rId15"/>
+    <p:sldId id="270" r:id="rId16"/>
+    <p:sldId id="272" r:id="rId17"/>
+    <p:sldId id="271" r:id="rId18"/>
+    <p:sldId id="257" r:id="rId19"/>
+    <p:sldId id="269" r:id="rId20"/>
   </p:sldIdLst>
   <p:sldSz cx="12192000" cy="6858000"/>
   <p:notesSz cx="6858000" cy="9144000"/>
@@ -214,7 +215,7 @@
           <a:p>
             <a:fld id="{8B6DED0A-447E-4A30-8199-4B8973620305}" type="datetimeFigureOut">
               <a:rPr lang="en-US" smtClean="0"/>
-              <a:t>6/9/2014</a:t>
+              <a:t>10/15/2014</a:t>
             </a:fld>
             <a:endParaRPr lang="en-US"/>
           </a:p>
@@ -551,7 +552,7 @@
           <a:p>
             <a:fld id="{4BA51557-0C11-4F36-B898-71E0648F520F}" type="slidenum">
               <a:rPr lang="en-US" smtClean="0"/>
-              <a:t>16</a:t>
+              <a:t>17</a:t>
             </a:fld>
             <a:endParaRPr lang="en-US"/>
           </a:p>
@@ -1073,7 +1074,7 @@
             <a:fld id="{B61BEF0D-F0BB-DE4B-95CE-6DB70DBA9567}" type="datetimeFigureOut">
               <a:rPr lang="en-US" dirty="0"/>
               <a:pPr/>
-              <a:t>6/9/2014</a:t>
+              <a:t>10/15/2014</a:t>
             </a:fld>
             <a:endParaRPr lang="en-US" dirty="0"/>
           </a:p>
@@ -1366,7 +1367,7 @@
             <a:fld id="{B61BEF0D-F0BB-DE4B-95CE-6DB70DBA9567}" type="datetimeFigureOut">
               <a:rPr lang="en-US" dirty="0"/>
               <a:pPr/>
-              <a:t>6/9/2014</a:t>
+              <a:t>10/15/2014</a:t>
             </a:fld>
             <a:endParaRPr lang="en-US" dirty="0"/>
           </a:p>
@@ -1611,7 +1612,7 @@
             <a:fld id="{B61BEF0D-F0BB-DE4B-95CE-6DB70DBA9567}" type="datetimeFigureOut">
               <a:rPr lang="en-US" dirty="0"/>
               <a:pPr/>
-              <a:t>6/9/2014</a:t>
+              <a:t>10/15/2014</a:t>
             </a:fld>
             <a:endParaRPr lang="en-US" dirty="0"/>
           </a:p>
@@ -2148,7 +2149,7 @@
             <a:fld id="{B61BEF0D-F0BB-DE4B-95CE-6DB70DBA9567}" type="datetimeFigureOut">
               <a:rPr lang="en-US" dirty="0"/>
               <a:pPr/>
-              <a:t>6/9/2014</a:t>
+              <a:t>10/15/2014</a:t>
             </a:fld>
             <a:endParaRPr lang="en-US" dirty="0"/>
           </a:p>
@@ -2393,7 +2394,7 @@
             <a:fld id="{B61BEF0D-F0BB-DE4B-95CE-6DB70DBA9567}" type="datetimeFigureOut">
               <a:rPr lang="en-US" dirty="0"/>
               <a:pPr/>
-              <a:t>6/9/2014</a:t>
+              <a:t>10/15/2014</a:t>
             </a:fld>
             <a:endParaRPr lang="en-US" dirty="0"/>
           </a:p>
@@ -2922,7 +2923,7 @@
             <a:fld id="{B61BEF0D-F0BB-DE4B-95CE-6DB70DBA9567}" type="datetimeFigureOut">
               <a:rPr lang="en-US" dirty="0"/>
               <a:pPr/>
-              <a:t>6/9/2014</a:t>
+              <a:t>10/15/2014</a:t>
             </a:fld>
             <a:endParaRPr lang="en-US" dirty="0"/>
           </a:p>
@@ -3216,7 +3217,7 @@
             <a:fld id="{B61BEF0D-F0BB-DE4B-95CE-6DB70DBA9567}" type="datetimeFigureOut">
               <a:rPr lang="en-US" dirty="0"/>
               <a:pPr/>
-              <a:t>6/9/2014</a:t>
+              <a:t>10/15/2014</a:t>
             </a:fld>
             <a:endParaRPr lang="en-US" dirty="0"/>
           </a:p>
@@ -3387,7 +3388,7 @@
             <a:fld id="{B61BEF0D-F0BB-DE4B-95CE-6DB70DBA9567}" type="datetimeFigureOut">
               <a:rPr lang="en-US" dirty="0"/>
               <a:pPr/>
-              <a:t>6/9/2014</a:t>
+              <a:t>10/15/2014</a:t>
             </a:fld>
             <a:endParaRPr lang="en-US" dirty="0"/>
           </a:p>
@@ -3564,7 +3565,7 @@
             <a:fld id="{B61BEF0D-F0BB-DE4B-95CE-6DB70DBA9567}" type="datetimeFigureOut">
               <a:rPr lang="en-US" dirty="0"/>
               <a:pPr/>
-              <a:t>6/9/2014</a:t>
+              <a:t>10/15/2014</a:t>
             </a:fld>
             <a:endParaRPr lang="en-US" dirty="0"/>
           </a:p>
@@ -3731,7 +3732,7 @@
             <a:fld id="{B61BEF0D-F0BB-DE4B-95CE-6DB70DBA9567}" type="datetimeFigureOut">
               <a:rPr lang="en-US" dirty="0"/>
               <a:pPr/>
-              <a:t>6/9/2014</a:t>
+              <a:t>10/15/2014</a:t>
             </a:fld>
             <a:endParaRPr lang="en-US" dirty="0"/>
           </a:p>
@@ -3979,7 +3980,7 @@
             <a:fld id="{B61BEF0D-F0BB-DE4B-95CE-6DB70DBA9567}" type="datetimeFigureOut">
               <a:rPr lang="en-US" dirty="0"/>
               <a:pPr/>
-              <a:t>6/9/2014</a:t>
+              <a:t>10/15/2014</a:t>
             </a:fld>
             <a:endParaRPr lang="en-US" dirty="0"/>
           </a:p>
@@ -4273,7 +4274,7 @@
             <a:fld id="{B61BEF0D-F0BB-DE4B-95CE-6DB70DBA9567}" type="datetimeFigureOut">
               <a:rPr lang="en-US" dirty="0"/>
               <a:pPr/>
-              <a:t>6/9/2014</a:t>
+              <a:t>10/15/2014</a:t>
             </a:fld>
             <a:endParaRPr lang="en-US" dirty="0"/>
           </a:p>
@@ -4712,7 +4713,7 @@
             <a:fld id="{B61BEF0D-F0BB-DE4B-95CE-6DB70DBA9567}" type="datetimeFigureOut">
               <a:rPr lang="en-US" dirty="0"/>
               <a:pPr/>
-              <a:t>6/9/2014</a:t>
+              <a:t>10/15/2014</a:t>
             </a:fld>
             <a:endParaRPr lang="en-US" dirty="0"/>
           </a:p>
@@ -4827,7 +4828,7 @@
             <a:fld id="{B61BEF0D-F0BB-DE4B-95CE-6DB70DBA9567}" type="datetimeFigureOut">
               <a:rPr lang="en-US" dirty="0"/>
               <a:pPr/>
-              <a:t>6/9/2014</a:t>
+              <a:t>10/15/2014</a:t>
             </a:fld>
             <a:endParaRPr lang="en-US" dirty="0"/>
           </a:p>
@@ -4919,7 +4920,7 @@
             <a:fld id="{B61BEF0D-F0BB-DE4B-95CE-6DB70DBA9567}" type="datetimeFigureOut">
               <a:rPr lang="en-US" dirty="0"/>
               <a:pPr/>
-              <a:t>6/9/2014</a:t>
+              <a:t>10/15/2014</a:t>
             </a:fld>
             <a:endParaRPr lang="en-US" dirty="0"/>
           </a:p>
@@ -5199,7 +5200,7 @@
             <a:fld id="{B61BEF0D-F0BB-DE4B-95CE-6DB70DBA9567}" type="datetimeFigureOut">
               <a:rPr lang="en-US" dirty="0"/>
               <a:pPr/>
-              <a:t>6/9/2014</a:t>
+              <a:t>10/15/2014</a:t>
             </a:fld>
             <a:endParaRPr lang="en-US" dirty="0"/>
           </a:p>
@@ -5487,7 +5488,7 @@
             <a:fld id="{B61BEF0D-F0BB-DE4B-95CE-6DB70DBA9567}" type="datetimeFigureOut">
               <a:rPr lang="en-US" dirty="0"/>
               <a:pPr/>
-              <a:t>6/9/2014</a:t>
+              <a:t>10/15/2014</a:t>
             </a:fld>
             <a:endParaRPr lang="en-US" dirty="0"/>
           </a:p>
@@ -6014,7 +6015,7 @@
             <a:fld id="{B61BEF0D-F0BB-DE4B-95CE-6DB70DBA9567}" type="datetimeFigureOut">
               <a:rPr lang="en-US" dirty="0"/>
               <a:pPr/>
-              <a:t>6/9/2014</a:t>
+              <a:t>10/15/2014</a:t>
             </a:fld>
             <a:endParaRPr lang="en-US" dirty="0"/>
           </a:p>
@@ -6654,7 +6655,11 @@
           <a:p>
             <a:r>
               <a:rPr lang="en-US" dirty="0" smtClean="0"/>
-              <a:t>Pure Functions</a:t>
+              <a:t>Using</a:t>
+            </a:r>
+            <a:r>
+              <a:rPr lang="en-US" baseline="0" dirty="0" smtClean="0"/>
+              <a:t> state and values</a:t>
             </a:r>
             <a:endParaRPr lang="en-US" dirty="0"/>
           </a:p>
@@ -6677,34 +6682,44 @@
           <a:p>
             <a:r>
               <a:rPr lang="en-US" dirty="0" smtClean="0"/>
-              <a:t>Thinks “math</a:t>
+              <a:t>Minimize and localize</a:t>
             </a:r>
             <a:r>
               <a:rPr lang="en-US" baseline="0" dirty="0" smtClean="0"/>
-              <a:t> functions”</a:t>
-            </a:r>
-            <a:endParaRPr lang="en-US" dirty="0" smtClean="0"/>
-          </a:p>
-          <a:p>
+              <a:t> state</a:t>
+            </a:r>
+          </a:p>
+          <a:p>
+            <a:pPr lvl="1"/>
+            <a:r>
+              <a:rPr lang="en-US" baseline="0" dirty="0" smtClean="0"/>
+              <a:t>Centralize state – every object needs a value, not  state</a:t>
+            </a:r>
+          </a:p>
+          <a:p>
+            <a:pPr lvl="1"/>
             <a:r>
               <a:rPr lang="en-US" dirty="0" smtClean="0"/>
-              <a:t>Functions</a:t>
-            </a:r>
+              <a:t>Localize state – keep state in a method, do not let it escape</a:t>
+            </a:r>
+            <a:endParaRPr lang="en-US" baseline="0" dirty="0" smtClean="0"/>
+          </a:p>
+          <a:p>
+            <a:pPr lvl="1"/>
             <a:r>
               <a:rPr lang="en-US" baseline="0" dirty="0" smtClean="0"/>
-              <a:t> vs methods</a:t>
-            </a:r>
+              <a:t>Façade pattern – make a state look like a</a:t>
+            </a:r>
+            <a:r>
+              <a:rPr lang="en-US" dirty="0" smtClean="0"/>
+              <a:t> value – it is only state if it actually changes</a:t>
+            </a:r>
+            <a:endParaRPr lang="en-US" baseline="0" dirty="0" smtClean="0"/>
           </a:p>
           <a:p>
             <a:r>
               <a:rPr lang="en-US" baseline="0" dirty="0" smtClean="0"/>
-              <a:t>Treating all inputs and outputs as values</a:t>
-            </a:r>
-          </a:p>
-          <a:p>
-            <a:r>
-              <a:rPr lang="en-US" baseline="0" dirty="0" smtClean="0"/>
-              <a:t>Separate data from functions</a:t>
+              <a:t>Favor pure functions</a:t>
             </a:r>
           </a:p>
         </p:txBody>
@@ -6712,7 +6727,7 @@
     </p:spTree>
     <p:extLst>
       <p:ext uri="{BB962C8B-B14F-4D97-AF65-F5344CB8AC3E}">
-        <p14:creationId xmlns:p14="http://schemas.microsoft.com/office/powerpoint/2010/main" val="2404869502"/>
+        <p14:creationId xmlns:p14="http://schemas.microsoft.com/office/powerpoint/2010/main" val="2183352308"/>
       </p:ext>
     </p:extLst>
   </p:cSld>
@@ -6756,127 +6771,65 @@
           <a:p>
             <a:r>
               <a:rPr lang="en-US" dirty="0" smtClean="0"/>
-              <a:t>Think</a:t>
+              <a:t>Pure Functions</a:t>
+            </a:r>
+            <a:endParaRPr lang="en-US" dirty="0"/>
+          </a:p>
+        </p:txBody>
+      </p:sp>
+      <p:sp>
+        <p:nvSpPr>
+          <p:cNvPr id="3" name="Content Placeholder 2"/>
+          <p:cNvSpPr>
+            <a:spLocks noGrp="1"/>
+          </p:cNvSpPr>
+          <p:nvPr>
+            <p:ph idx="1"/>
+          </p:nvPr>
+        </p:nvSpPr>
+        <p:spPr/>
+        <p:txBody>
+          <a:bodyPr/>
+          <a:lstStyle/>
+          <a:p>
+            <a:r>
+              <a:rPr lang="en-US" dirty="0" smtClean="0"/>
+              <a:t>Thinks “math</a:t>
             </a:r>
             <a:r>
               <a:rPr lang="en-US" baseline="0" dirty="0" smtClean="0"/>
-              <a:t> Math Functions</a:t>
-            </a:r>
-            <a:endParaRPr lang="en-US" dirty="0"/>
-          </a:p>
-        </p:txBody>
-      </p:sp>
-      <p:sp>
-        <p:nvSpPr>
-          <p:cNvPr id="3" name="Content Placeholder 2"/>
-          <p:cNvSpPr>
-            <a:spLocks noGrp="1"/>
-          </p:cNvSpPr>
-          <p:nvPr>
-            <p:ph idx="1"/>
-          </p:nvPr>
-        </p:nvSpPr>
-        <p:spPr/>
-        <p:txBody>
-          <a:bodyPr numCol="2">
-            <a:normAutofit/>
-          </a:bodyPr>
-          <a:lstStyle/>
+              <a:t> functions”</a:t>
+            </a:r>
+            <a:endParaRPr lang="en-US" dirty="0" smtClean="0"/>
+          </a:p>
           <a:p>
             <a:r>
               <a:rPr lang="en-US" dirty="0" smtClean="0"/>
-              <a:t>f(x) = x * x</a:t>
-            </a:r>
-          </a:p>
-          <a:p>
-            <a:r>
-              <a:rPr lang="en-US" dirty="0" smtClean="0"/>
-              <a:t>Inputs are</a:t>
+              <a:t>Functions</a:t>
             </a:r>
             <a:r>
               <a:rPr lang="en-US" baseline="0" dirty="0" smtClean="0"/>
-              <a:t> values – output is a value</a:t>
-            </a:r>
-            <a:endParaRPr lang="en-US" dirty="0" smtClean="0"/>
-          </a:p>
-          <a:p>
-            <a:r>
-              <a:rPr lang="en-US" dirty="0" smtClean="0"/>
-              <a:t>No side effects</a:t>
-            </a:r>
-          </a:p>
-          <a:p>
-            <a:pPr lvl="1"/>
-            <a:r>
-              <a:rPr lang="en-US" dirty="0" smtClean="0"/>
-              <a:t>No state change</a:t>
-            </a:r>
-          </a:p>
-          <a:p>
-            <a:pPr lvl="1"/>
-            <a:r>
-              <a:rPr lang="en-US" dirty="0" smtClean="0"/>
-              <a:t>arguments</a:t>
-            </a:r>
+              <a:t> vs methods</a:t>
+            </a:r>
+          </a:p>
+          <a:p>
             <a:r>
               <a:rPr lang="en-US" baseline="0" dirty="0" smtClean="0"/>
-              <a:t> </a:t>
-            </a:r>
+              <a:t>Treating all inputs and outputs as values</a:t>
+            </a:r>
+          </a:p>
+          <a:p>
             <a:r>
               <a:rPr lang="en-US" baseline="0" dirty="0" smtClean="0"/>
-              <a:t>unaffected - collections</a:t>
-            </a:r>
-            <a:endParaRPr lang="en-US" baseline="0" dirty="0" smtClean="0"/>
-          </a:p>
-          <a:p>
-            <a:pPr lvl="1"/>
-            <a:r>
-              <a:rPr lang="en-US" baseline="0" dirty="0" smtClean="0"/>
-              <a:t>calling with the same arguments yields the same results</a:t>
-            </a:r>
-          </a:p>
-          <a:p>
-            <a:pPr lvl="0"/>
-            <a:endParaRPr lang="en-US" dirty="0" smtClean="0"/>
-          </a:p>
-          <a:p>
-            <a:pPr marL="0" lvl="0" indent="0">
-              <a:buNone/>
-            </a:pPr>
-            <a:endParaRPr lang="en-US" i="1" dirty="0" smtClean="0"/>
-          </a:p>
-          <a:p>
-            <a:pPr marL="0" lvl="0" indent="0">
-              <a:buNone/>
-            </a:pPr>
-            <a:r>
-              <a:rPr lang="en-US" i="1" dirty="0" smtClean="0"/>
-              <a:t>Seriously</a:t>
-            </a:r>
-            <a:r>
-              <a:rPr lang="en-US" i="1" dirty="0" smtClean="0"/>
-              <a:t>, </a:t>
-            </a:r>
-            <a:r>
-              <a:rPr lang="en-US" i="1" dirty="0" smtClean="0"/>
-              <a:t>all this </a:t>
-            </a:r>
-            <a:r>
-              <a:rPr lang="en-US" i="1" dirty="0" smtClean="0"/>
-              <a:t>is really useful</a:t>
-            </a:r>
-            <a:r>
-              <a:rPr lang="en-US" dirty="0" smtClean="0"/>
-              <a:t>.</a:t>
-            </a:r>
-            <a:endParaRPr lang="en-US" dirty="0"/>
+              <a:t>Separate data from functions</a:t>
+            </a:r>
           </a:p>
         </p:txBody>
       </p:sp>
     </p:spTree>
     <p:extLst>
       <p:ext uri="{BB962C8B-B14F-4D97-AF65-F5344CB8AC3E}">
-        <p14:creationId xmlns:p14="http://schemas.microsoft.com/office/powerpoint/2010/main" val="811614220"/>
+        <p14:creationId xmlns:p14="http://schemas.microsoft.com/office/powerpoint/2010/main" val="2404869502"/>
       </p:ext>
     </p:extLst>
   </p:cSld>
@@ -6920,7 +6873,11 @@
           <a:p>
             <a:r>
               <a:rPr lang="en-US" dirty="0" smtClean="0"/>
-              <a:t>Functions Vs Methods</a:t>
+              <a:t>Think</a:t>
+            </a:r>
+            <a:r>
+              <a:rPr lang="en-US" baseline="0" dirty="0" smtClean="0"/>
+              <a:t> Math Functions</a:t>
             </a:r>
             <a:endParaRPr lang="en-US" dirty="0"/>
           </a:p>
@@ -6938,53 +6895,88 @@
         </p:nvSpPr>
         <p:spPr/>
         <p:txBody>
-          <a:bodyPr/>
+          <a:bodyPr numCol="2">
+            <a:normAutofit/>
+          </a:bodyPr>
           <a:lstStyle/>
           <a:p>
             <a:r>
               <a:rPr lang="en-US" dirty="0" smtClean="0"/>
-              <a:t>Difference</a:t>
+              <a:t>f(x) = x * x</a:t>
+            </a:r>
+          </a:p>
+          <a:p>
+            <a:r>
+              <a:rPr lang="en-US" dirty="0" smtClean="0"/>
+              <a:t>Inputs are</a:t>
             </a:r>
             <a:r>
               <a:rPr lang="en-US" baseline="0" dirty="0" smtClean="0"/>
-              <a:t> between functions and methods</a:t>
+              <a:t> values – output is a value</a:t>
+            </a:r>
+            <a:endParaRPr lang="en-US" dirty="0" smtClean="0"/>
+          </a:p>
+          <a:p>
+            <a:r>
+              <a:rPr lang="en-US" dirty="0" smtClean="0"/>
+              <a:t>No side effects</a:t>
             </a:r>
           </a:p>
           <a:p>
             <a:pPr lvl="1"/>
             <a:r>
               <a:rPr lang="en-US" dirty="0" smtClean="0"/>
-              <a:t>Dynamic</a:t>
+              <a:t>No state change</a:t>
+            </a:r>
+          </a:p>
+          <a:p>
+            <a:pPr lvl="1"/>
+            <a:r>
+              <a:rPr lang="en-US" dirty="0" smtClean="0"/>
+              <a:t>arguments</a:t>
             </a:r>
             <a:r>
               <a:rPr lang="en-US" baseline="0" dirty="0" smtClean="0"/>
-              <a:t> dispatch</a:t>
+              <a:t> unaffected - collections</a:t>
             </a:r>
           </a:p>
           <a:p>
             <a:pPr lvl="1"/>
             <a:r>
               <a:rPr lang="en-US" baseline="0" dirty="0" smtClean="0"/>
-              <a:t>Implied “this”</a:t>
+              <a:t>calling with the same arguments yields the same results</a:t>
             </a:r>
           </a:p>
           <a:p>
             <a:pPr lvl="0"/>
+            <a:endParaRPr lang="en-US" dirty="0" smtClean="0"/>
+          </a:p>
+          <a:p>
+            <a:pPr marL="0" lvl="0" indent="0">
+              <a:buNone/>
+            </a:pPr>
+            <a:endParaRPr lang="en-US" i="1" dirty="0" smtClean="0"/>
+          </a:p>
+          <a:p>
+            <a:pPr marL="0" lvl="0" indent="0">
+              <a:buNone/>
+            </a:pPr>
+            <a:r>
+              <a:rPr lang="en-US" i="1" dirty="0" smtClean="0"/>
+              <a:t>Seriously, all this is really useful</a:t>
+            </a:r>
             <a:r>
               <a:rPr lang="en-US" dirty="0" smtClean="0"/>
-              <a:t>Does not matter in</a:t>
-            </a:r>
-            <a:r>
-              <a:rPr lang="en-US" baseline="0" dirty="0" smtClean="0"/>
-              <a:t> the least – I am going to call them functions</a:t>
-            </a:r>
+              <a:t>.</a:t>
+            </a:r>
+            <a:endParaRPr lang="en-US" dirty="0"/>
           </a:p>
         </p:txBody>
       </p:sp>
     </p:spTree>
     <p:extLst>
       <p:ext uri="{BB962C8B-B14F-4D97-AF65-F5344CB8AC3E}">
-        <p14:creationId xmlns:p14="http://schemas.microsoft.com/office/powerpoint/2010/main" val="4077021880"/>
+        <p14:creationId xmlns:p14="http://schemas.microsoft.com/office/powerpoint/2010/main" val="811614220"/>
       </p:ext>
     </p:extLst>
   </p:cSld>
@@ -7028,93 +7020,71 @@
           <a:p>
             <a:r>
               <a:rPr lang="en-US" dirty="0" smtClean="0"/>
-              <a:t>Treating</a:t>
+              <a:t>Functions Vs Methods</a:t>
+            </a:r>
+            <a:endParaRPr lang="en-US" dirty="0"/>
+          </a:p>
+        </p:txBody>
+      </p:sp>
+      <p:sp>
+        <p:nvSpPr>
+          <p:cNvPr id="3" name="Content Placeholder 2"/>
+          <p:cNvSpPr>
+            <a:spLocks noGrp="1"/>
+          </p:cNvSpPr>
+          <p:nvPr>
+            <p:ph idx="1"/>
+          </p:nvPr>
+        </p:nvSpPr>
+        <p:spPr/>
+        <p:txBody>
+          <a:bodyPr/>
+          <a:lstStyle/>
+          <a:p>
+            <a:r>
+              <a:rPr lang="en-US" dirty="0" smtClean="0"/>
+              <a:t>Difference</a:t>
             </a:r>
             <a:r>
               <a:rPr lang="en-US" baseline="0" dirty="0" smtClean="0"/>
-              <a:t> all </a:t>
+              <a:t> between functions and methods</a:t>
+            </a:r>
+          </a:p>
+          <a:p>
+            <a:pPr lvl="1"/>
+            <a:r>
+              <a:rPr lang="en-US" dirty="0" smtClean="0"/>
+              <a:t>Dynamic</a:t>
             </a:r>
             <a:r>
               <a:rPr lang="en-US" baseline="0" dirty="0" smtClean="0"/>
-              <a:t>inputs/outputs </a:t>
-            </a:r>
+              <a:t> dispatch</a:t>
+            </a:r>
+          </a:p>
+          <a:p>
+            <a:pPr lvl="1"/>
             <a:r>
               <a:rPr lang="en-US" baseline="0" dirty="0" smtClean="0"/>
-              <a:t>as values</a:t>
-            </a:r>
-            <a:endParaRPr lang="en-US" dirty="0"/>
-          </a:p>
-        </p:txBody>
-      </p:sp>
-      <p:sp>
-        <p:nvSpPr>
-          <p:cNvPr id="3" name="Content Placeholder 2"/>
-          <p:cNvSpPr>
-            <a:spLocks noGrp="1"/>
-          </p:cNvSpPr>
-          <p:nvPr>
-            <p:ph idx="1"/>
-          </p:nvPr>
-        </p:nvSpPr>
-        <p:spPr/>
-        <p:txBody>
-          <a:bodyPr/>
-          <a:lstStyle/>
-          <a:p>
+              <a:t>Implied “this”</a:t>
+            </a:r>
+          </a:p>
+          <a:p>
+            <a:pPr lvl="0"/>
             <a:r>
               <a:rPr lang="en-US" dirty="0" smtClean="0"/>
-              <a:t>Best to actually pass values</a:t>
-            </a:r>
-          </a:p>
-          <a:p>
-            <a:r>
-              <a:rPr lang="en-US" dirty="0" smtClean="0"/>
-              <a:t>Code</a:t>
+              <a:t>Does not matter in</a:t>
             </a:r>
             <a:r>
               <a:rPr lang="en-US" baseline="0" dirty="0" smtClean="0"/>
-              <a:t> </a:t>
-            </a:r>
-            <a:r>
-              <a:rPr lang="en-US" baseline="0" dirty="0" smtClean="0"/>
-              <a:t>to interfaces</a:t>
-            </a:r>
-          </a:p>
-          <a:p>
-            <a:r>
-              <a:rPr lang="en-US" baseline="0" dirty="0" smtClean="0"/>
-              <a:t>Never alter an input</a:t>
-            </a:r>
-          </a:p>
-          <a:p>
-            <a:r>
-              <a:rPr lang="en-US" baseline="0" dirty="0" smtClean="0"/>
-              <a:t>Decorator pattern</a:t>
-            </a:r>
-          </a:p>
-          <a:p>
-            <a:r>
-              <a:rPr lang="en-US" baseline="0" dirty="0" smtClean="0"/>
-              <a:t>Visitor/Iterator </a:t>
-            </a:r>
-            <a:r>
-              <a:rPr lang="en-US" baseline="0" dirty="0" smtClean="0"/>
-              <a:t>pattern</a:t>
-            </a:r>
-          </a:p>
-          <a:p>
-            <a:r>
-              <a:rPr lang="en-US" dirty="0" smtClean="0"/>
-              <a:t>Return values where possible</a:t>
-            </a:r>
-            <a:endParaRPr lang="en-US" dirty="0"/>
+              <a:t> the least – I am going to call them functions</a:t>
+            </a:r>
           </a:p>
         </p:txBody>
       </p:sp>
     </p:spTree>
     <p:extLst>
       <p:ext uri="{BB962C8B-B14F-4D97-AF65-F5344CB8AC3E}">
-        <p14:creationId xmlns:p14="http://schemas.microsoft.com/office/powerpoint/2010/main" val="1604626286"/>
+        <p14:creationId xmlns:p14="http://schemas.microsoft.com/office/powerpoint/2010/main" val="4077021880"/>
       </p:ext>
     </p:extLst>
   </p:cSld>
@@ -7158,7 +7128,11 @@
           <a:p>
             <a:r>
               <a:rPr lang="en-US" dirty="0" smtClean="0"/>
-              <a:t>Separate data from functions</a:t>
+              <a:t>Treating</a:t>
+            </a:r>
+            <a:r>
+              <a:rPr lang="en-US" baseline="0" dirty="0" smtClean="0"/>
+              <a:t> all inputs/outputs as values</a:t>
             </a:r>
             <a:endParaRPr lang="en-US" dirty="0"/>
           </a:p>
@@ -7181,38 +7155,50 @@
           <a:p>
             <a:r>
               <a:rPr lang="en-US" dirty="0" smtClean="0"/>
-              <a:t>Forget “Objects</a:t>
+              <a:t>Best to actually pass values</a:t>
+            </a:r>
+          </a:p>
+          <a:p>
+            <a:r>
+              <a:rPr lang="en-US" dirty="0" smtClean="0"/>
+              <a:t>Code</a:t>
             </a:r>
             <a:r>
               <a:rPr lang="en-US" baseline="0" dirty="0" smtClean="0"/>
-              <a:t> should </a:t>
-            </a:r>
+              <a:t> to interfaces</a:t>
+            </a:r>
+          </a:p>
+          <a:p>
             <a:r>
               <a:rPr lang="en-US" baseline="0" dirty="0" smtClean="0"/>
-              <a:t>know how to  … for themselves”</a:t>
-            </a:r>
-            <a:endParaRPr lang="en-US" baseline="0" dirty="0" smtClean="0"/>
+              <a:t>Never alter an input</a:t>
+            </a:r>
+          </a:p>
+          <a:p>
+            <a:r>
+              <a:rPr lang="en-US" baseline="0" dirty="0" smtClean="0"/>
+              <a:t>Decorator pattern</a:t>
+            </a:r>
+          </a:p>
+          <a:p>
+            <a:r>
+              <a:rPr lang="en-US" baseline="0" dirty="0" smtClean="0"/>
+              <a:t>Visitor/Iterator pattern</a:t>
+            </a:r>
           </a:p>
           <a:p>
             <a:r>
               <a:rPr lang="en-US" dirty="0" smtClean="0"/>
-              <a:t>Use Strategy pattern to define algorithms outside</a:t>
-            </a:r>
-            <a:r>
-              <a:rPr lang="en-US" baseline="0" dirty="0" smtClean="0"/>
-              <a:t> the values they work </a:t>
-            </a:r>
-            <a:r>
-              <a:rPr lang="en-US" baseline="0" dirty="0" smtClean="0"/>
-              <a:t>on</a:t>
-            </a:r>
+              <a:t>Return values where possible</a:t>
+            </a:r>
+            <a:endParaRPr lang="en-US" dirty="0"/>
           </a:p>
         </p:txBody>
       </p:sp>
     </p:spTree>
     <p:extLst>
       <p:ext uri="{BB962C8B-B14F-4D97-AF65-F5344CB8AC3E}">
-        <p14:creationId xmlns:p14="http://schemas.microsoft.com/office/powerpoint/2010/main" val="64466811"/>
+        <p14:creationId xmlns:p14="http://schemas.microsoft.com/office/powerpoint/2010/main" val="1604626286"/>
       </p:ext>
     </p:extLst>
   </p:cSld>
@@ -7256,226 +7242,44 @@
           <a:p>
             <a:r>
               <a:rPr lang="en-US" dirty="0" smtClean="0"/>
-              <a:t>For loops and state</a:t>
-            </a:r>
-            <a:br>
+              <a:t>Separate data from functions</a:t>
+            </a:r>
+            <a:endParaRPr lang="en-US" dirty="0"/>
+          </a:p>
+        </p:txBody>
+      </p:sp>
+      <p:sp>
+        <p:nvSpPr>
+          <p:cNvPr id="3" name="Content Placeholder 2"/>
+          <p:cNvSpPr>
+            <a:spLocks noGrp="1"/>
+          </p:cNvSpPr>
+          <p:nvPr>
+            <p:ph idx="1"/>
+          </p:nvPr>
+        </p:nvSpPr>
+        <p:spPr/>
+        <p:txBody>
+          <a:bodyPr/>
+          <a:lstStyle/>
+          <a:p>
+            <a:r>
               <a:rPr lang="en-US" dirty="0" smtClean="0"/>
-            </a:br>
+              <a:t>Forget “Objects</a:t>
+            </a:r>
+            <a:r>
+              <a:rPr lang="en-US" baseline="0" dirty="0" smtClean="0"/>
+              <a:t> should know how to  … for themselves”</a:t>
+            </a:r>
+          </a:p>
+          <a:p>
             <a:r>
               <a:rPr lang="en-US" dirty="0" smtClean="0"/>
-              <a:t>Iterators do not help</a:t>
-            </a:r>
-            <a:endParaRPr lang="en-US" dirty="0"/>
-          </a:p>
-        </p:txBody>
-      </p:sp>
-      <p:sp>
-        <p:nvSpPr>
-          <p:cNvPr id="3" name="Content Placeholder 2"/>
-          <p:cNvSpPr>
-            <a:spLocks noGrp="1"/>
-          </p:cNvSpPr>
-          <p:nvPr>
-            <p:ph idx="1"/>
-          </p:nvPr>
-        </p:nvSpPr>
-        <p:spPr/>
-        <p:txBody>
-          <a:bodyPr/>
-          <a:lstStyle/>
-          <a:p>
-            <a:pPr marL="0" indent="0">
-              <a:buNone/>
-            </a:pPr>
-            <a:r>
-              <a:rPr lang="en-US" dirty="0" err="1">
-                <a:latin typeface="Courier New" panose="02070309020205020404" pitchFamily="49" charset="0"/>
-                <a:cs typeface="Courier New" panose="02070309020205020404" pitchFamily="49" charset="0"/>
-              </a:rPr>
-              <a:t>i</a:t>
-            </a:r>
-            <a:r>
-              <a:rPr lang="en-US" dirty="0" err="1" smtClean="0">
-                <a:latin typeface="Courier New" panose="02070309020205020404" pitchFamily="49" charset="0"/>
-                <a:cs typeface="Courier New" panose="02070309020205020404" pitchFamily="49" charset="0"/>
-              </a:rPr>
-              <a:t>nt</a:t>
-            </a:r>
-            <a:r>
-              <a:rPr lang="en-US" dirty="0" smtClean="0">
-                <a:latin typeface="Courier New" panose="02070309020205020404" pitchFamily="49" charset="0"/>
-                <a:cs typeface="Courier New" panose="02070309020205020404" pitchFamily="49" charset="0"/>
-              </a:rPr>
-              <a:t> </a:t>
-            </a:r>
-            <a:r>
-              <a:rPr lang="en-US" dirty="0" smtClean="0">
-                <a:solidFill>
-                  <a:srgbClr val="FF0000"/>
-                </a:solidFill>
-                <a:latin typeface="Courier New" panose="02070309020205020404" pitchFamily="49" charset="0"/>
-                <a:cs typeface="Courier New" panose="02070309020205020404" pitchFamily="49" charset="0"/>
-              </a:rPr>
-              <a:t>sum</a:t>
-            </a:r>
-            <a:r>
-              <a:rPr lang="en-US" dirty="0" smtClean="0">
-                <a:latin typeface="Courier New" panose="02070309020205020404" pitchFamily="49" charset="0"/>
-                <a:cs typeface="Courier New" panose="02070309020205020404" pitchFamily="49" charset="0"/>
-              </a:rPr>
-              <a:t> = 0;</a:t>
-            </a:r>
-          </a:p>
-          <a:p>
-            <a:pPr marL="0" indent="0">
-              <a:buNone/>
-            </a:pPr>
-            <a:r>
-              <a:rPr lang="en-US" dirty="0" smtClean="0">
-                <a:latin typeface="Courier New" panose="02070309020205020404" pitchFamily="49" charset="0"/>
-                <a:cs typeface="Courier New" panose="02070309020205020404" pitchFamily="49" charset="0"/>
-              </a:rPr>
-              <a:t>for(</a:t>
-            </a:r>
-            <a:r>
-              <a:rPr lang="en-US" dirty="0" err="1" smtClean="0">
-                <a:latin typeface="Courier New" panose="02070309020205020404" pitchFamily="49" charset="0"/>
-                <a:cs typeface="Courier New" panose="02070309020205020404" pitchFamily="49" charset="0"/>
-              </a:rPr>
-              <a:t>int</a:t>
-            </a:r>
-            <a:r>
-              <a:rPr lang="en-US" dirty="0" smtClean="0">
-                <a:latin typeface="Courier New" panose="02070309020205020404" pitchFamily="49" charset="0"/>
-                <a:cs typeface="Courier New" panose="02070309020205020404" pitchFamily="49" charset="0"/>
-              </a:rPr>
-              <a:t> </a:t>
-            </a:r>
-            <a:r>
-              <a:rPr lang="en-US" dirty="0" err="1" smtClean="0">
-                <a:solidFill>
-                  <a:srgbClr val="FF0000"/>
-                </a:solidFill>
-                <a:latin typeface="Courier New" panose="02070309020205020404" pitchFamily="49" charset="0"/>
-                <a:cs typeface="Courier New" panose="02070309020205020404" pitchFamily="49" charset="0"/>
-              </a:rPr>
-              <a:t>i</a:t>
-            </a:r>
-            <a:r>
-              <a:rPr lang="en-US" dirty="0" smtClean="0">
-                <a:latin typeface="Courier New" panose="02070309020205020404" pitchFamily="49" charset="0"/>
-                <a:cs typeface="Courier New" panose="02070309020205020404" pitchFamily="49" charset="0"/>
-              </a:rPr>
-              <a:t> = 0; </a:t>
-            </a:r>
-            <a:r>
-              <a:rPr lang="en-US" dirty="0" err="1" smtClean="0">
-                <a:solidFill>
-                  <a:srgbClr val="FF0000"/>
-                </a:solidFill>
-                <a:latin typeface="Courier New" panose="02070309020205020404" pitchFamily="49" charset="0"/>
-                <a:cs typeface="Courier New" panose="02070309020205020404" pitchFamily="49" charset="0"/>
-              </a:rPr>
-              <a:t>i</a:t>
-            </a:r>
-            <a:r>
-              <a:rPr lang="en-US" dirty="0" smtClean="0">
-                <a:latin typeface="Courier New" panose="02070309020205020404" pitchFamily="49" charset="0"/>
-                <a:cs typeface="Courier New" panose="02070309020205020404" pitchFamily="49" charset="0"/>
-              </a:rPr>
-              <a:t> &lt; 10 ; ++</a:t>
-            </a:r>
-            <a:r>
-              <a:rPr lang="en-US" dirty="0" err="1" smtClean="0">
-                <a:solidFill>
-                  <a:srgbClr val="FF0000"/>
-                </a:solidFill>
-                <a:latin typeface="Courier New" panose="02070309020205020404" pitchFamily="49" charset="0"/>
-                <a:cs typeface="Courier New" panose="02070309020205020404" pitchFamily="49" charset="0"/>
-              </a:rPr>
-              <a:t>i</a:t>
-            </a:r>
-            <a:r>
-              <a:rPr lang="en-US" dirty="0" smtClean="0">
-                <a:latin typeface="Courier New" panose="02070309020205020404" pitchFamily="49" charset="0"/>
-                <a:cs typeface="Courier New" panose="02070309020205020404" pitchFamily="49" charset="0"/>
-              </a:rPr>
-              <a:t>) {</a:t>
-            </a:r>
-          </a:p>
-          <a:p>
-            <a:pPr marL="0" indent="0">
-              <a:buNone/>
-            </a:pPr>
-            <a:r>
-              <a:rPr lang="en-US" dirty="0" smtClean="0">
-                <a:latin typeface="Courier New" panose="02070309020205020404" pitchFamily="49" charset="0"/>
-                <a:cs typeface="Courier New" panose="02070309020205020404" pitchFamily="49" charset="0"/>
-              </a:rPr>
-              <a:t>    if(</a:t>
-            </a:r>
-            <a:r>
-              <a:rPr lang="en-US" dirty="0" err="1" smtClean="0">
-                <a:solidFill>
-                  <a:srgbClr val="FF0000"/>
-                </a:solidFill>
-                <a:latin typeface="Courier New" panose="02070309020205020404" pitchFamily="49" charset="0"/>
-                <a:cs typeface="Courier New" panose="02070309020205020404" pitchFamily="49" charset="0"/>
-              </a:rPr>
-              <a:t>i</a:t>
-            </a:r>
-            <a:r>
-              <a:rPr lang="en-US" dirty="0" smtClean="0">
-                <a:latin typeface="Courier New" panose="02070309020205020404" pitchFamily="49" charset="0"/>
-                <a:cs typeface="Courier New" panose="02070309020205020404" pitchFamily="49" charset="0"/>
-              </a:rPr>
-              <a:t> % 2 == 0) </a:t>
-            </a:r>
-            <a:r>
-              <a:rPr lang="en-US" dirty="0" smtClean="0">
-                <a:solidFill>
-                  <a:srgbClr val="FF0000"/>
-                </a:solidFill>
-                <a:latin typeface="Courier New" panose="02070309020205020404" pitchFamily="49" charset="0"/>
-                <a:cs typeface="Courier New" panose="02070309020205020404" pitchFamily="49" charset="0"/>
-              </a:rPr>
-              <a:t>sum</a:t>
-            </a:r>
-            <a:r>
-              <a:rPr lang="en-US" dirty="0" smtClean="0">
-                <a:latin typeface="Courier New" panose="02070309020205020404" pitchFamily="49" charset="0"/>
-                <a:cs typeface="Courier New" panose="02070309020205020404" pitchFamily="49" charset="0"/>
-              </a:rPr>
-              <a:t> += </a:t>
-            </a:r>
-            <a:r>
-              <a:rPr lang="en-US" dirty="0" err="1" smtClean="0">
-                <a:solidFill>
-                  <a:srgbClr val="FF0000"/>
-                </a:solidFill>
-                <a:latin typeface="Courier New" panose="02070309020205020404" pitchFamily="49" charset="0"/>
-                <a:cs typeface="Courier New" panose="02070309020205020404" pitchFamily="49" charset="0"/>
-              </a:rPr>
-              <a:t>i</a:t>
-            </a:r>
-            <a:r>
-              <a:rPr lang="en-US" dirty="0" smtClean="0">
-                <a:latin typeface="Courier New" panose="02070309020205020404" pitchFamily="49" charset="0"/>
-                <a:cs typeface="Courier New" panose="02070309020205020404" pitchFamily="49" charset="0"/>
-              </a:rPr>
-              <a:t>;</a:t>
-            </a:r>
-          </a:p>
-          <a:p>
-            <a:pPr marL="0" indent="0">
-              <a:buNone/>
-            </a:pPr>
-            <a:r>
-              <a:rPr lang="en-US" dirty="0">
-                <a:latin typeface="Courier New" panose="02070309020205020404" pitchFamily="49" charset="0"/>
-                <a:cs typeface="Courier New" panose="02070309020205020404" pitchFamily="49" charset="0"/>
-              </a:rPr>
-              <a:t>}</a:t>
+              <a:t>Use Strategy pattern to define algorithms outside</a:t>
+            </a:r>
+            <a:r>
+              <a:rPr lang="en-US" baseline="0" dirty="0" smtClean="0"/>
+              <a:t> the values they work on</a:t>
             </a:r>
           </a:p>
         </p:txBody>
@@ -7483,7 +7287,7 @@
     </p:spTree>
     <p:extLst>
       <p:ext uri="{BB962C8B-B14F-4D97-AF65-F5344CB8AC3E}">
-        <p14:creationId xmlns:p14="http://schemas.microsoft.com/office/powerpoint/2010/main" val="1589485030"/>
+        <p14:creationId xmlns:p14="http://schemas.microsoft.com/office/powerpoint/2010/main" val="64466811"/>
       </p:ext>
     </p:extLst>
   </p:cSld>
@@ -7527,11 +7331,14 @@
           <a:p>
             <a:r>
               <a:rPr lang="en-US" dirty="0" smtClean="0"/>
-              <a:t>Lambdas</a:t>
-            </a:r>
-            <a:r>
-              <a:rPr lang="en-US" baseline="0" dirty="0" smtClean="0"/>
-              <a:t> and Streams</a:t>
+              <a:t>For loops and state</a:t>
+            </a:r>
+            <a:br>
+              <a:rPr lang="en-US" dirty="0" smtClean="0"/>
+            </a:br>
+            <a:r>
+              <a:rPr lang="en-US" dirty="0" smtClean="0"/>
+              <a:t>Iterators do not help</a:t>
             </a:r>
             <a:endParaRPr lang="en-US" dirty="0"/>
           </a:p>
@@ -7547,253 +7354,211 @@
             <p:ph idx="1"/>
           </p:nvPr>
         </p:nvSpPr>
-        <p:spPr>
-          <a:xfrm>
-            <a:off x="1301431" y="2596660"/>
-            <a:ext cx="3594127" cy="2734995"/>
-          </a:xfrm>
-        </p:spPr>
-        <p:txBody>
-          <a:bodyPr>
-            <a:normAutofit/>
-          </a:bodyPr>
+        <p:spPr/>
+        <p:txBody>
+          <a:bodyPr/>
           <a:lstStyle/>
           <a:p>
             <a:pPr marL="0" indent="0">
               <a:buNone/>
             </a:pPr>
             <a:r>
-              <a:rPr lang="pt-BR" dirty="0" smtClean="0"/>
-              <a:t>Find the names of albums that have at least one track rated four or  higher,  sorted by  name, </a:t>
-            </a:r>
-            <a:r>
-              <a:rPr lang="pt-BR" i="1" dirty="0" smtClean="0"/>
-              <a:t>without state</a:t>
-            </a:r>
-            <a:r>
-              <a:rPr lang="pt-BR" dirty="0" smtClean="0"/>
-              <a:t>.</a:t>
-            </a:r>
-          </a:p>
-        </p:txBody>
-      </p:sp>
-      <p:sp>
-        <p:nvSpPr>
-          <p:cNvPr id="4" name="TextBox 3"/>
-          <p:cNvSpPr txBox="1"/>
-          <p:nvPr/>
-        </p:nvSpPr>
-        <p:spPr>
-          <a:xfrm>
-            <a:off x="5317588" y="2948494"/>
-            <a:ext cx="6513342" cy="2031325"/>
-          </a:xfrm>
-          <a:prstGeom prst="rect">
-            <a:avLst/>
-          </a:prstGeom>
-          <a:noFill/>
-        </p:spPr>
-        <p:txBody>
-          <a:bodyPr wrap="square" rtlCol="0">
-            <a:spAutoFit/>
-          </a:bodyPr>
-          <a:lstStyle/>
-          <a:p>
-            <a:r>
-              <a:rPr lang="pt-BR" dirty="0" smtClean="0">
+              <a:rPr lang="en-US" dirty="0" err="1">
                 <a:latin typeface="Courier New" panose="02070309020205020404" pitchFamily="49" charset="0"/>
                 <a:cs typeface="Courier New" panose="02070309020205020404" pitchFamily="49" charset="0"/>
               </a:rPr>
-              <a:t>List&lt;Album&gt; sortedFavs = albums</a:t>
-            </a:r>
-          </a:p>
-          <a:p>
-            <a:pPr lvl="1"/>
-            <a:r>
-              <a:rPr lang="pt-BR" dirty="0" smtClean="0">
+              <a:t>i</a:t>
+            </a:r>
+            <a:r>
+              <a:rPr lang="en-US" dirty="0" err="1" smtClean="0">
                 <a:latin typeface="Courier New" panose="02070309020205020404" pitchFamily="49" charset="0"/>
                 <a:cs typeface="Courier New" panose="02070309020205020404" pitchFamily="49" charset="0"/>
               </a:rPr>
-              <a:t>.</a:t>
-            </a:r>
-            <a:r>
-              <a:rPr lang="pt-BR" b="1" dirty="0" smtClean="0">
-                <a:effectLst>
-                  <a:outerShdw blurRad="38100" dist="38100" dir="2700000" algn="tl">
-                    <a:srgbClr val="000000">
-                      <a:alpha val="43137"/>
-                    </a:srgbClr>
-                  </a:outerShdw>
-                </a:effectLst>
-                <a:latin typeface="Courier New" panose="02070309020205020404" pitchFamily="49" charset="0"/>
-                <a:cs typeface="Courier New" panose="02070309020205020404" pitchFamily="49" charset="0"/>
-              </a:rPr>
-              <a:t>stream </a:t>
-            </a:r>
-            <a:r>
-              <a:rPr lang="pt-BR" dirty="0" smtClean="0">
-                <a:latin typeface="Courier New" panose="02070309020205020404" pitchFamily="49" charset="0"/>
-                <a:cs typeface="Courier New" panose="02070309020205020404" pitchFamily="49" charset="0"/>
-              </a:rPr>
-              <a:t>()</a:t>
-            </a:r>
-            <a:endParaRPr lang="pt-BR" dirty="0">
-              <a:latin typeface="Courier New" panose="02070309020205020404" pitchFamily="49" charset="0"/>
-              <a:cs typeface="Courier New" panose="02070309020205020404" pitchFamily="49" charset="0"/>
-            </a:endParaRPr>
-          </a:p>
-          <a:p>
-            <a:pPr lvl="1"/>
-            <a:r>
-              <a:rPr lang="pt-BR" dirty="0" smtClean="0">
-                <a:latin typeface="Courier New" panose="02070309020205020404" pitchFamily="49" charset="0"/>
-                <a:cs typeface="Courier New" panose="02070309020205020404" pitchFamily="49" charset="0"/>
-              </a:rPr>
-              <a:t>.</a:t>
-            </a:r>
-            <a:r>
-              <a:rPr lang="pt-BR" b="1" dirty="0" smtClean="0">
-                <a:effectLst>
-                  <a:outerShdw blurRad="38100" dist="38100" dir="2700000" algn="tl">
-                    <a:srgbClr val="000000">
-                      <a:alpha val="43137"/>
-                    </a:srgbClr>
-                  </a:outerShdw>
-                </a:effectLst>
-                <a:latin typeface="Courier New" panose="02070309020205020404" pitchFamily="49" charset="0"/>
-                <a:cs typeface="Courier New" panose="02070309020205020404" pitchFamily="49" charset="0"/>
-              </a:rPr>
-              <a:t>filter </a:t>
-            </a:r>
-            <a:r>
-              <a:rPr lang="pt-BR" dirty="0" smtClean="0">
-                <a:latin typeface="Courier New" panose="02070309020205020404" pitchFamily="49" charset="0"/>
-                <a:cs typeface="Courier New" panose="02070309020205020404" pitchFamily="49" charset="0"/>
-              </a:rPr>
-              <a:t>( a-&gt;a.tracks</a:t>
-            </a:r>
-          </a:p>
-          <a:p>
-            <a:pPr lvl="4"/>
-            <a:r>
-              <a:rPr lang="pt-BR" dirty="0" smtClean="0">
-                <a:latin typeface="Courier New" panose="02070309020205020404" pitchFamily="49" charset="0"/>
-                <a:cs typeface="Courier New" panose="02070309020205020404" pitchFamily="49" charset="0"/>
-              </a:rPr>
-              <a:t>.stream()</a:t>
-            </a:r>
-          </a:p>
-          <a:p>
-            <a:pPr lvl="4"/>
-            <a:r>
-              <a:rPr lang="pt-BR" dirty="0" smtClean="0">
-                <a:latin typeface="Courier New" panose="02070309020205020404" pitchFamily="49" charset="0"/>
-                <a:cs typeface="Courier New" panose="02070309020205020404" pitchFamily="49" charset="0"/>
-              </a:rPr>
-              <a:t>.anyMatch(t-&gt; (t.rating &gt;= 4 )))</a:t>
-            </a:r>
-            <a:endParaRPr lang="pt-BR" dirty="0">
-              <a:latin typeface="Courier New" panose="02070309020205020404" pitchFamily="49" charset="0"/>
-              <a:cs typeface="Courier New" panose="02070309020205020404" pitchFamily="49" charset="0"/>
-            </a:endParaRPr>
-          </a:p>
-          <a:p>
-            <a:pPr lvl="1"/>
-            <a:r>
-              <a:rPr lang="pt-BR" dirty="0" smtClean="0">
-                <a:latin typeface="Courier New" panose="02070309020205020404" pitchFamily="49" charset="0"/>
-                <a:cs typeface="Courier New" panose="02070309020205020404" pitchFamily="49" charset="0"/>
-              </a:rPr>
-              <a:t>.</a:t>
-            </a:r>
-            <a:r>
-              <a:rPr lang="pt-BR" b="1" dirty="0" smtClean="0">
-                <a:effectLst>
-                  <a:outerShdw blurRad="38100" dist="38100" dir="2700000" algn="tl">
-                    <a:srgbClr val="000000">
-                      <a:alpha val="43137"/>
-                    </a:srgbClr>
-                  </a:outerShdw>
-                </a:effectLst>
-                <a:latin typeface="Courier New" panose="02070309020205020404" pitchFamily="49" charset="0"/>
-                <a:cs typeface="Courier New" panose="02070309020205020404" pitchFamily="49" charset="0"/>
-              </a:rPr>
-              <a:t>sorted</a:t>
-            </a:r>
-            <a:r>
-              <a:rPr lang="pt-BR" b="1" dirty="0" smtClean="0">
+              <a:t>nt</a:t>
+            </a:r>
+            <a:r>
+              <a:rPr lang="en-US" dirty="0" smtClean="0">
                 <a:latin typeface="Courier New" panose="02070309020205020404" pitchFamily="49" charset="0"/>
                 <a:cs typeface="Courier New" panose="02070309020205020404" pitchFamily="49" charset="0"/>
               </a:rPr>
               <a:t> </a:t>
             </a:r>
             <a:r>
-              <a:rPr lang="pt-BR" dirty="0" smtClean="0">
+              <a:rPr lang="en-US" dirty="0" smtClean="0">
+                <a:solidFill>
+                  <a:srgbClr val="FF0000"/>
+                </a:solidFill>
                 <a:latin typeface="Courier New" panose="02070309020205020404" pitchFamily="49" charset="0"/>
                 <a:cs typeface="Courier New" panose="02070309020205020404" pitchFamily="49" charset="0"/>
               </a:rPr>
-              <a:t>(Comparator.comparing( a-&gt; a.name))</a:t>
-            </a:r>
-            <a:endParaRPr lang="pt-BR" dirty="0">
-              <a:latin typeface="Courier New" panose="02070309020205020404" pitchFamily="49" charset="0"/>
-              <a:cs typeface="Courier New" panose="02070309020205020404" pitchFamily="49" charset="0"/>
-            </a:endParaRPr>
-          </a:p>
-          <a:p>
-            <a:pPr lvl="1"/>
-            <a:r>
-              <a:rPr lang="pt-BR" dirty="0" smtClean="0">
+              <a:t>sum</a:t>
+            </a:r>
+            <a:r>
+              <a:rPr lang="en-US" dirty="0" smtClean="0">
                 <a:latin typeface="Courier New" panose="02070309020205020404" pitchFamily="49" charset="0"/>
                 <a:cs typeface="Courier New" panose="02070309020205020404" pitchFamily="49" charset="0"/>
               </a:rPr>
-              <a:t>.</a:t>
-            </a:r>
-            <a:r>
-              <a:rPr lang="pt-BR" b="1" dirty="0" smtClean="0">
-                <a:effectLst>
-                  <a:outerShdw blurRad="38100" dist="38100" dir="2700000" algn="tl">
-                    <a:srgbClr val="000000">
-                      <a:alpha val="43137"/>
-                    </a:srgbClr>
-                  </a:outerShdw>
-                </a:effectLst>
+              <a:t> = 0;</a:t>
+            </a:r>
+          </a:p>
+          <a:p>
+            <a:pPr marL="0" indent="0">
+              <a:buNone/>
+            </a:pPr>
+            <a:r>
+              <a:rPr lang="en-US" dirty="0" smtClean="0">
                 <a:latin typeface="Courier New" panose="02070309020205020404" pitchFamily="49" charset="0"/>
                 <a:cs typeface="Courier New" panose="02070309020205020404" pitchFamily="49" charset="0"/>
               </a:rPr>
-              <a:t>collect</a:t>
-            </a:r>
-            <a:r>
-              <a:rPr lang="pt-BR" dirty="0" smtClean="0">
-                <a:effectLst>
-                  <a:outerShdw blurRad="38100" dist="38100" dir="2700000" algn="tl">
-                    <a:srgbClr val="000000">
-                      <a:alpha val="43137"/>
-                    </a:srgbClr>
-                  </a:outerShdw>
-                </a:effectLst>
+              <a:t>for(</a:t>
+            </a:r>
+            <a:r>
+              <a:rPr lang="en-US" dirty="0" err="1" smtClean="0">
+                <a:latin typeface="Courier New" panose="02070309020205020404" pitchFamily="49" charset="0"/>
+                <a:cs typeface="Courier New" panose="02070309020205020404" pitchFamily="49" charset="0"/>
+              </a:rPr>
+              <a:t>int</a:t>
+            </a:r>
+            <a:r>
+              <a:rPr lang="en-US" dirty="0" smtClean="0">
                 <a:latin typeface="Courier New" panose="02070309020205020404" pitchFamily="49" charset="0"/>
                 <a:cs typeface="Courier New" panose="02070309020205020404" pitchFamily="49" charset="0"/>
               </a:rPr>
               <a:t> </a:t>
             </a:r>
             <a:r>
-              <a:rPr lang="pt-BR" dirty="0" smtClean="0">
+              <a:rPr lang="en-US" dirty="0" err="1" smtClean="0">
+                <a:solidFill>
+                  <a:srgbClr val="FF0000"/>
+                </a:solidFill>
                 <a:latin typeface="Courier New" panose="02070309020205020404" pitchFamily="49" charset="0"/>
                 <a:cs typeface="Courier New" panose="02070309020205020404" pitchFamily="49" charset="0"/>
               </a:rPr>
-              <a:t>(Collectors.toList());</a:t>
-            </a:r>
-            <a:endParaRPr lang="en-US" dirty="0">
-              <a:latin typeface="Courier New" panose="02070309020205020404" pitchFamily="49" charset="0"/>
-              <a:cs typeface="Courier New" panose="02070309020205020404" pitchFamily="49" charset="0"/>
-            </a:endParaRPr>
+              <a:t>i</a:t>
+            </a:r>
+            <a:r>
+              <a:rPr lang="en-US" dirty="0" smtClean="0">
+                <a:latin typeface="Courier New" panose="02070309020205020404" pitchFamily="49" charset="0"/>
+                <a:cs typeface="Courier New" panose="02070309020205020404" pitchFamily="49" charset="0"/>
+              </a:rPr>
+              <a:t> = 0; </a:t>
+            </a:r>
+            <a:r>
+              <a:rPr lang="en-US" dirty="0" err="1" smtClean="0">
+                <a:solidFill>
+                  <a:srgbClr val="FF0000"/>
+                </a:solidFill>
+                <a:latin typeface="Courier New" panose="02070309020205020404" pitchFamily="49" charset="0"/>
+                <a:cs typeface="Courier New" panose="02070309020205020404" pitchFamily="49" charset="0"/>
+              </a:rPr>
+              <a:t>i</a:t>
+            </a:r>
+            <a:r>
+              <a:rPr lang="en-US" dirty="0" smtClean="0">
+                <a:latin typeface="Courier New" panose="02070309020205020404" pitchFamily="49" charset="0"/>
+                <a:cs typeface="Courier New" panose="02070309020205020404" pitchFamily="49" charset="0"/>
+              </a:rPr>
+              <a:t> &lt; 10 ; ++</a:t>
+            </a:r>
+            <a:r>
+              <a:rPr lang="en-US" dirty="0" err="1" smtClean="0">
+                <a:solidFill>
+                  <a:srgbClr val="FF0000"/>
+                </a:solidFill>
+                <a:latin typeface="Courier New" panose="02070309020205020404" pitchFamily="49" charset="0"/>
+                <a:cs typeface="Courier New" panose="02070309020205020404" pitchFamily="49" charset="0"/>
+              </a:rPr>
+              <a:t>i</a:t>
+            </a:r>
+            <a:r>
+              <a:rPr lang="en-US" dirty="0" smtClean="0">
+                <a:latin typeface="Courier New" panose="02070309020205020404" pitchFamily="49" charset="0"/>
+                <a:cs typeface="Courier New" panose="02070309020205020404" pitchFamily="49" charset="0"/>
+              </a:rPr>
+              <a:t>) {</a:t>
+            </a:r>
+          </a:p>
+          <a:p>
+            <a:pPr marL="0" indent="0">
+              <a:buNone/>
+            </a:pPr>
+            <a:r>
+              <a:rPr lang="en-US" dirty="0" smtClean="0">
+                <a:latin typeface="Courier New" panose="02070309020205020404" pitchFamily="49" charset="0"/>
+                <a:cs typeface="Courier New" panose="02070309020205020404" pitchFamily="49" charset="0"/>
+              </a:rPr>
+              <a:t>    if(</a:t>
+            </a:r>
+            <a:r>
+              <a:rPr lang="en-US" dirty="0" err="1" smtClean="0">
+                <a:solidFill>
+                  <a:srgbClr val="FF0000"/>
+                </a:solidFill>
+                <a:latin typeface="Courier New" panose="02070309020205020404" pitchFamily="49" charset="0"/>
+                <a:cs typeface="Courier New" panose="02070309020205020404" pitchFamily="49" charset="0"/>
+              </a:rPr>
+              <a:t>i</a:t>
+            </a:r>
+            <a:r>
+              <a:rPr lang="en-US" dirty="0" smtClean="0">
+                <a:latin typeface="Courier New" panose="02070309020205020404" pitchFamily="49" charset="0"/>
+                <a:cs typeface="Courier New" panose="02070309020205020404" pitchFamily="49" charset="0"/>
+              </a:rPr>
+              <a:t> % 2 == 0) </a:t>
+            </a:r>
+            <a:r>
+              <a:rPr lang="en-US" dirty="0" smtClean="0">
+                <a:solidFill>
+                  <a:srgbClr val="FF0000"/>
+                </a:solidFill>
+                <a:latin typeface="Courier New" panose="02070309020205020404" pitchFamily="49" charset="0"/>
+                <a:cs typeface="Courier New" panose="02070309020205020404" pitchFamily="49" charset="0"/>
+              </a:rPr>
+              <a:t>sum</a:t>
+            </a:r>
+            <a:r>
+              <a:rPr lang="en-US" dirty="0" smtClean="0">
+                <a:latin typeface="Courier New" panose="02070309020205020404" pitchFamily="49" charset="0"/>
+                <a:cs typeface="Courier New" panose="02070309020205020404" pitchFamily="49" charset="0"/>
+              </a:rPr>
+              <a:t> += </a:t>
+            </a:r>
+            <a:r>
+              <a:rPr lang="en-US" dirty="0" err="1" smtClean="0">
+                <a:solidFill>
+                  <a:srgbClr val="FF0000"/>
+                </a:solidFill>
+                <a:latin typeface="Courier New" panose="02070309020205020404" pitchFamily="49" charset="0"/>
+                <a:cs typeface="Courier New" panose="02070309020205020404" pitchFamily="49" charset="0"/>
+              </a:rPr>
+              <a:t>i</a:t>
+            </a:r>
+            <a:r>
+              <a:rPr lang="en-US" dirty="0" smtClean="0">
+                <a:latin typeface="Courier New" panose="02070309020205020404" pitchFamily="49" charset="0"/>
+                <a:cs typeface="Courier New" panose="02070309020205020404" pitchFamily="49" charset="0"/>
+              </a:rPr>
+              <a:t>;</a:t>
+            </a:r>
+          </a:p>
+          <a:p>
+            <a:pPr marL="0" indent="0">
+              <a:buNone/>
+            </a:pPr>
+            <a:r>
+              <a:rPr lang="en-US" dirty="0">
+                <a:latin typeface="Courier New" panose="02070309020205020404" pitchFamily="49" charset="0"/>
+                <a:cs typeface="Courier New" panose="02070309020205020404" pitchFamily="49" charset="0"/>
+              </a:rPr>
+              <a:t>}</a:t>
+            </a:r>
           </a:p>
         </p:txBody>
       </p:sp>
     </p:spTree>
     <p:extLst>
       <p:ext uri="{BB962C8B-B14F-4D97-AF65-F5344CB8AC3E}">
-        <p14:creationId xmlns:p14="http://schemas.microsoft.com/office/powerpoint/2010/main" val="3783412475"/>
+        <p14:creationId xmlns:p14="http://schemas.microsoft.com/office/powerpoint/2010/main" val="1589485030"/>
       </p:ext>
     </p:extLst>
   </p:cSld>
@@ -7837,11 +7602,11 @@
           <a:p>
             <a:r>
               <a:rPr lang="en-US" dirty="0" smtClean="0"/>
-              <a:t>Demo – </a:t>
-            </a:r>
-            <a:r>
-              <a:rPr lang="en-US" dirty="0" err="1" smtClean="0"/>
-              <a:t>FunctionalDate</a:t>
+              <a:t>Lambdas</a:t>
+            </a:r>
+            <a:r>
+              <a:rPr lang="en-US" baseline="0" dirty="0" smtClean="0"/>
+              <a:t> and Streams</a:t>
             </a:r>
             <a:endParaRPr lang="en-US" dirty="0"/>
           </a:p>
@@ -7857,78 +7622,253 @@
             <p:ph idx="1"/>
           </p:nvPr>
         </p:nvSpPr>
-        <p:spPr/>
-        <p:txBody>
-          <a:bodyPr/>
-          <a:lstStyle/>
-          <a:p>
-            <a:r>
-              <a:rPr lang="en-US" dirty="0" smtClean="0"/>
-              <a:t>Value</a:t>
-            </a:r>
-          </a:p>
-          <a:p>
-            <a:r>
-              <a:rPr lang="en-US" dirty="0" smtClean="0"/>
-              <a:t>predicates</a:t>
-            </a:r>
-            <a:r>
-              <a:rPr lang="en-US" baseline="0" dirty="0" smtClean="0"/>
-              <a:t> – before, after – code to interface Comparable</a:t>
+        <p:spPr>
+          <a:xfrm>
+            <a:off x="1301431" y="2596660"/>
+            <a:ext cx="3594127" cy="2734995"/>
+          </a:xfrm>
+        </p:spPr>
+        <p:txBody>
+          <a:bodyPr>
+            <a:normAutofit/>
+          </a:bodyPr>
+          <a:lstStyle/>
+          <a:p>
+            <a:pPr marL="0" indent="0">
+              <a:buNone/>
+            </a:pPr>
+            <a:r>
+              <a:rPr lang="pt-BR" dirty="0" smtClean="0"/>
+              <a:t>Find the names of albums that have at least one track rated four or  higher,  sorted by  name, </a:t>
+            </a:r>
+            <a:r>
+              <a:rPr lang="pt-BR" i="1" dirty="0" smtClean="0"/>
+              <a:t>without state</a:t>
+            </a:r>
+            <a:r>
+              <a:rPr lang="pt-BR" dirty="0" smtClean="0"/>
+              <a:t>.</a:t>
+            </a:r>
+          </a:p>
+        </p:txBody>
+      </p:sp>
+      <p:sp>
+        <p:nvSpPr>
+          <p:cNvPr id="4" name="TextBox 3"/>
+          <p:cNvSpPr txBox="1"/>
+          <p:nvPr/>
+        </p:nvSpPr>
+        <p:spPr>
+          <a:xfrm>
+            <a:off x="5317588" y="2948494"/>
+            <a:ext cx="6513342" cy="2031325"/>
+          </a:xfrm>
+          <a:prstGeom prst="rect">
+            <a:avLst/>
+          </a:prstGeom>
+          <a:noFill/>
+        </p:spPr>
+        <p:txBody>
+          <a:bodyPr wrap="square" rtlCol="0">
+            <a:spAutoFit/>
+          </a:bodyPr>
+          <a:lstStyle/>
+          <a:p>
+            <a:r>
+              <a:rPr lang="pt-BR" dirty="0" smtClean="0">
+                <a:latin typeface="Courier New" panose="02070309020205020404" pitchFamily="49" charset="0"/>
+                <a:cs typeface="Courier New" panose="02070309020205020404" pitchFamily="49" charset="0"/>
+              </a:rPr>
+              <a:t>List&lt;Album&gt; sortedFavs = albums</a:t>
             </a:r>
           </a:p>
           <a:p>
             <a:pPr lvl="1"/>
             <a:r>
-              <a:rPr lang="en-US" baseline="0" dirty="0" smtClean="0"/>
-              <a:t>Could be reused with all </a:t>
-            </a:r>
-            <a:r>
-              <a:rPr lang="en-US" baseline="0" dirty="0" err="1" smtClean="0"/>
-              <a:t>Comparables</a:t>
-            </a:r>
-            <a:endParaRPr lang="en-US" baseline="0" dirty="0" smtClean="0"/>
-          </a:p>
-          <a:p>
-            <a:r>
-              <a:rPr lang="en-US" dirty="0" smtClean="0"/>
-              <a:t>giving meaning -</a:t>
-            </a:r>
-            <a:r>
-              <a:rPr lang="en-US" baseline="0" dirty="0" smtClean="0"/>
+              <a:rPr lang="pt-BR" dirty="0" smtClean="0">
+                <a:latin typeface="Courier New" panose="02070309020205020404" pitchFamily="49" charset="0"/>
+                <a:cs typeface="Courier New" panose="02070309020205020404" pitchFamily="49" charset="0"/>
+              </a:rPr>
+              <a:t>.</a:t>
+            </a:r>
+            <a:r>
+              <a:rPr lang="pt-BR" b="1" dirty="0" smtClean="0">
+                <a:effectLst>
+                  <a:outerShdw blurRad="38100" dist="38100" dir="2700000" algn="tl">
+                    <a:srgbClr val="000000">
+                      <a:alpha val="43137"/>
+                    </a:srgbClr>
+                  </a:outerShdw>
+                </a:effectLst>
+                <a:latin typeface="Courier New" panose="02070309020205020404" pitchFamily="49" charset="0"/>
+                <a:cs typeface="Courier New" panose="02070309020205020404" pitchFamily="49" charset="0"/>
+              </a:rPr>
+              <a:t>stream </a:t>
+            </a:r>
+            <a:r>
+              <a:rPr lang="pt-BR" dirty="0" smtClean="0">
+                <a:latin typeface="Courier New" panose="02070309020205020404" pitchFamily="49" charset="0"/>
+                <a:cs typeface="Courier New" panose="02070309020205020404" pitchFamily="49" charset="0"/>
+              </a:rPr>
+              <a:t>()</a:t>
+            </a:r>
+            <a:endParaRPr lang="pt-BR" dirty="0">
+              <a:latin typeface="Courier New" panose="02070309020205020404" pitchFamily="49" charset="0"/>
+              <a:cs typeface="Courier New" panose="02070309020205020404" pitchFamily="49" charset="0"/>
+            </a:endParaRPr>
+          </a:p>
+          <a:p>
+            <a:pPr lvl="1"/>
+            <a:r>
+              <a:rPr lang="pt-BR" dirty="0" smtClean="0">
+                <a:latin typeface="Courier New" panose="02070309020205020404" pitchFamily="49" charset="0"/>
+                <a:cs typeface="Courier New" panose="02070309020205020404" pitchFamily="49" charset="0"/>
+              </a:rPr>
+              <a:t>.</a:t>
+            </a:r>
+            <a:r>
+              <a:rPr lang="pt-BR" b="1" dirty="0" smtClean="0">
+                <a:effectLst>
+                  <a:outerShdw blurRad="38100" dist="38100" dir="2700000" algn="tl">
+                    <a:srgbClr val="000000">
+                      <a:alpha val="43137"/>
+                    </a:srgbClr>
+                  </a:outerShdw>
+                </a:effectLst>
+                <a:latin typeface="Courier New" panose="02070309020205020404" pitchFamily="49" charset="0"/>
+                <a:cs typeface="Courier New" panose="02070309020205020404" pitchFamily="49" charset="0"/>
+              </a:rPr>
+              <a:t>filter </a:t>
+            </a:r>
+            <a:r>
+              <a:rPr lang="pt-BR" dirty="0" smtClean="0">
+                <a:latin typeface="Courier New" panose="02070309020205020404" pitchFamily="49" charset="0"/>
+                <a:cs typeface="Courier New" panose="02070309020205020404" pitchFamily="49" charset="0"/>
+              </a:rPr>
+              <a:t>( a-&gt;a.tracks</a:t>
+            </a:r>
+          </a:p>
+          <a:p>
+            <a:pPr lvl="4"/>
+            <a:r>
+              <a:rPr lang="pt-BR" dirty="0" smtClean="0">
+                <a:latin typeface="Courier New" panose="02070309020205020404" pitchFamily="49" charset="0"/>
+                <a:cs typeface="Courier New" panose="02070309020205020404" pitchFamily="49" charset="0"/>
+              </a:rPr>
+              <a:t>.stream()</a:t>
+            </a:r>
+          </a:p>
+          <a:p>
+            <a:pPr lvl="4"/>
+            <a:r>
+              <a:rPr lang="pt-BR" dirty="0" smtClean="0">
+                <a:latin typeface="Courier New" panose="02070309020205020404" pitchFamily="49" charset="0"/>
+                <a:cs typeface="Courier New" panose="02070309020205020404" pitchFamily="49" charset="0"/>
+              </a:rPr>
+              <a:t>.anyMatch(t-&gt; (t.rating &gt;= 4 )))</a:t>
+            </a:r>
+            <a:endParaRPr lang="pt-BR" dirty="0">
+              <a:latin typeface="Courier New" panose="02070309020205020404" pitchFamily="49" charset="0"/>
+              <a:cs typeface="Courier New" panose="02070309020205020404" pitchFamily="49" charset="0"/>
+            </a:endParaRPr>
+          </a:p>
+          <a:p>
+            <a:pPr lvl="1"/>
+            <a:r>
+              <a:rPr lang="pt-BR" dirty="0" smtClean="0">
+                <a:latin typeface="Courier New" panose="02070309020205020404" pitchFamily="49" charset="0"/>
+                <a:cs typeface="Courier New" panose="02070309020205020404" pitchFamily="49" charset="0"/>
+              </a:rPr>
+              <a:t>.</a:t>
+            </a:r>
+            <a:r>
+              <a:rPr lang="pt-BR" b="1" dirty="0" smtClean="0">
+                <a:effectLst>
+                  <a:outerShdw blurRad="38100" dist="38100" dir="2700000" algn="tl">
+                    <a:srgbClr val="000000">
+                      <a:alpha val="43137"/>
+                    </a:srgbClr>
+                  </a:outerShdw>
+                </a:effectLst>
+                <a:latin typeface="Courier New" panose="02070309020205020404" pitchFamily="49" charset="0"/>
+                <a:cs typeface="Courier New" panose="02070309020205020404" pitchFamily="49" charset="0"/>
+              </a:rPr>
+              <a:t>sorted</a:t>
+            </a:r>
+            <a:r>
+              <a:rPr lang="pt-BR" b="1" dirty="0" smtClean="0">
+                <a:latin typeface="Courier New" panose="02070309020205020404" pitchFamily="49" charset="0"/>
+                <a:cs typeface="Courier New" panose="02070309020205020404" pitchFamily="49" charset="0"/>
+              </a:rPr>
               <a:t> </a:t>
             </a:r>
             <a:r>
-              <a:rPr lang="en-US" dirty="0" smtClean="0"/>
-              <a:t>calendar – parse,</a:t>
-            </a:r>
-            <a:r>
-              <a:rPr lang="en-US" baseline="0" dirty="0" smtClean="0"/>
-              <a:t> format – strategy: value =&gt; value</a:t>
-            </a:r>
+              <a:rPr lang="pt-BR" dirty="0" smtClean="0">
+                <a:latin typeface="Courier New" panose="02070309020205020404" pitchFamily="49" charset="0"/>
+                <a:cs typeface="Courier New" panose="02070309020205020404" pitchFamily="49" charset="0"/>
+              </a:rPr>
+              <a:t>(Comparator.comparing( a-&gt; a.name))</a:t>
+            </a:r>
+            <a:endParaRPr lang="pt-BR" dirty="0">
+              <a:latin typeface="Courier New" panose="02070309020205020404" pitchFamily="49" charset="0"/>
+              <a:cs typeface="Courier New" panose="02070309020205020404" pitchFamily="49" charset="0"/>
+            </a:endParaRPr>
           </a:p>
           <a:p>
             <a:pPr lvl="1"/>
             <a:r>
-              <a:rPr lang="en-US" dirty="0" smtClean="0"/>
-              <a:t>Gregorian, Chinese, Hebrew, </a:t>
-            </a:r>
-            <a:r>
-              <a:rPr lang="en-US" dirty="0" err="1" smtClean="0"/>
-              <a:t>etc</a:t>
-            </a:r>
-            <a:endParaRPr lang="en-US" dirty="0" smtClean="0"/>
-          </a:p>
-          <a:p>
-            <a:pPr lvl="0"/>
-            <a:endParaRPr lang="en-US" dirty="0" smtClean="0"/>
+              <a:rPr lang="pt-BR" dirty="0" smtClean="0">
+                <a:latin typeface="Courier New" panose="02070309020205020404" pitchFamily="49" charset="0"/>
+                <a:cs typeface="Courier New" panose="02070309020205020404" pitchFamily="49" charset="0"/>
+              </a:rPr>
+              <a:t>.</a:t>
+            </a:r>
+            <a:r>
+              <a:rPr lang="pt-BR" b="1" dirty="0" smtClean="0">
+                <a:effectLst>
+                  <a:outerShdw blurRad="38100" dist="38100" dir="2700000" algn="tl">
+                    <a:srgbClr val="000000">
+                      <a:alpha val="43137"/>
+                    </a:srgbClr>
+                  </a:outerShdw>
+                </a:effectLst>
+                <a:latin typeface="Courier New" panose="02070309020205020404" pitchFamily="49" charset="0"/>
+                <a:cs typeface="Courier New" panose="02070309020205020404" pitchFamily="49" charset="0"/>
+              </a:rPr>
+              <a:t>collect</a:t>
+            </a:r>
+            <a:r>
+              <a:rPr lang="pt-BR" dirty="0" smtClean="0">
+                <a:effectLst>
+                  <a:outerShdw blurRad="38100" dist="38100" dir="2700000" algn="tl">
+                    <a:srgbClr val="000000">
+                      <a:alpha val="43137"/>
+                    </a:srgbClr>
+                  </a:outerShdw>
+                </a:effectLst>
+                <a:latin typeface="Courier New" panose="02070309020205020404" pitchFamily="49" charset="0"/>
+                <a:cs typeface="Courier New" panose="02070309020205020404" pitchFamily="49" charset="0"/>
+              </a:rPr>
+              <a:t> </a:t>
+            </a:r>
+            <a:r>
+              <a:rPr lang="pt-BR" dirty="0" smtClean="0">
+                <a:latin typeface="Courier New" panose="02070309020205020404" pitchFamily="49" charset="0"/>
+                <a:cs typeface="Courier New" panose="02070309020205020404" pitchFamily="49" charset="0"/>
+              </a:rPr>
+              <a:t>(Collectors.toList());</a:t>
+            </a:r>
+            <a:endParaRPr lang="en-US" dirty="0">
+              <a:latin typeface="Courier New" panose="02070309020205020404" pitchFamily="49" charset="0"/>
+              <a:cs typeface="Courier New" panose="02070309020205020404" pitchFamily="49" charset="0"/>
+            </a:endParaRPr>
           </a:p>
         </p:txBody>
       </p:sp>
     </p:spTree>
     <p:extLst>
       <p:ext uri="{BB962C8B-B14F-4D97-AF65-F5344CB8AC3E}">
-        <p14:creationId xmlns:p14="http://schemas.microsoft.com/office/powerpoint/2010/main" val="3695196690"/>
+        <p14:creationId xmlns:p14="http://schemas.microsoft.com/office/powerpoint/2010/main" val="3783412475"/>
       </p:ext>
     </p:extLst>
   </p:cSld>
@@ -7972,6 +7912,141 @@
           <a:p>
             <a:r>
               <a:rPr lang="en-US" dirty="0" smtClean="0"/>
+              <a:t>Demo – </a:t>
+            </a:r>
+            <a:r>
+              <a:rPr lang="en-US" dirty="0" err="1" smtClean="0"/>
+              <a:t>FunctionalDate</a:t>
+            </a:r>
+            <a:endParaRPr lang="en-US" dirty="0"/>
+          </a:p>
+        </p:txBody>
+      </p:sp>
+      <p:sp>
+        <p:nvSpPr>
+          <p:cNvPr id="3" name="Content Placeholder 2"/>
+          <p:cNvSpPr>
+            <a:spLocks noGrp="1"/>
+          </p:cNvSpPr>
+          <p:nvPr>
+            <p:ph idx="1"/>
+          </p:nvPr>
+        </p:nvSpPr>
+        <p:spPr/>
+        <p:txBody>
+          <a:bodyPr/>
+          <a:lstStyle/>
+          <a:p>
+            <a:r>
+              <a:rPr lang="en-US" dirty="0" smtClean="0"/>
+              <a:t>Value</a:t>
+            </a:r>
+          </a:p>
+          <a:p>
+            <a:r>
+              <a:rPr lang="en-US" dirty="0" smtClean="0"/>
+              <a:t>predicates</a:t>
+            </a:r>
+            <a:r>
+              <a:rPr lang="en-US" baseline="0" dirty="0" smtClean="0"/>
+              <a:t> – before, after – code to interface Comparable</a:t>
+            </a:r>
+          </a:p>
+          <a:p>
+            <a:pPr lvl="1"/>
+            <a:r>
+              <a:rPr lang="en-US" baseline="0" dirty="0" smtClean="0"/>
+              <a:t>Could be reused with all </a:t>
+            </a:r>
+            <a:r>
+              <a:rPr lang="en-US" baseline="0" dirty="0" err="1" smtClean="0"/>
+              <a:t>Comparables</a:t>
+            </a:r>
+            <a:endParaRPr lang="en-US" baseline="0" dirty="0" smtClean="0"/>
+          </a:p>
+          <a:p>
+            <a:r>
+              <a:rPr lang="en-US" dirty="0" smtClean="0"/>
+              <a:t>giving meaning -</a:t>
+            </a:r>
+            <a:r>
+              <a:rPr lang="en-US" baseline="0" dirty="0" smtClean="0"/>
+              <a:t> </a:t>
+            </a:r>
+            <a:r>
+              <a:rPr lang="en-US" dirty="0" smtClean="0"/>
+              <a:t>calendar – parse,</a:t>
+            </a:r>
+            <a:r>
+              <a:rPr lang="en-US" baseline="0" dirty="0" smtClean="0"/>
+              <a:t> format – strategy: value =&gt; value</a:t>
+            </a:r>
+          </a:p>
+          <a:p>
+            <a:pPr lvl="1"/>
+            <a:r>
+              <a:rPr lang="en-US" dirty="0" smtClean="0"/>
+              <a:t>Gregorian, Chinese, Hebrew, </a:t>
+            </a:r>
+            <a:r>
+              <a:rPr lang="en-US" dirty="0" err="1" smtClean="0"/>
+              <a:t>etc</a:t>
+            </a:r>
+            <a:endParaRPr lang="en-US" dirty="0" smtClean="0"/>
+          </a:p>
+          <a:p>
+            <a:pPr lvl="0"/>
+            <a:endParaRPr lang="en-US" dirty="0" smtClean="0"/>
+          </a:p>
+        </p:txBody>
+      </p:sp>
+    </p:spTree>
+    <p:extLst>
+      <p:ext uri="{BB962C8B-B14F-4D97-AF65-F5344CB8AC3E}">
+        <p14:creationId xmlns:p14="http://schemas.microsoft.com/office/powerpoint/2010/main" val="3695196690"/>
+      </p:ext>
+    </p:extLst>
+  </p:cSld>
+  <p:clrMapOvr>
+    <a:masterClrMapping/>
+  </p:clrMapOvr>
+</p:sld>
+</file>
+
+<file path=ppt/slides/slide19.xml><?xml version="1.0" encoding="utf-8"?>
+<p:sld xmlns:a="http://schemas.openxmlformats.org/drawingml/2006/main" xmlns:r="http://schemas.openxmlformats.org/officeDocument/2006/relationships" xmlns:p="http://schemas.openxmlformats.org/presentationml/2006/main">
+  <p:cSld>
+    <p:spTree>
+      <p:nvGrpSpPr>
+        <p:cNvPr id="1" name=""/>
+        <p:cNvGrpSpPr/>
+        <p:nvPr/>
+      </p:nvGrpSpPr>
+      <p:grpSpPr>
+        <a:xfrm>
+          <a:off x="0" y="0"/>
+          <a:ext cx="0" cy="0"/>
+          <a:chOff x="0" y="0"/>
+          <a:chExt cx="0" cy="0"/>
+        </a:xfrm>
+      </p:grpSpPr>
+      <p:sp>
+        <p:nvSpPr>
+          <p:cNvPr id="2" name="Title 1"/>
+          <p:cNvSpPr>
+            <a:spLocks noGrp="1"/>
+          </p:cNvSpPr>
+          <p:nvPr>
+            <p:ph type="title"/>
+          </p:nvPr>
+        </p:nvSpPr>
+        <p:spPr/>
+        <p:txBody>
+          <a:bodyPr/>
+          <a:lstStyle/>
+          <a:p>
+            <a:r>
+              <a:rPr lang="en-US" dirty="0" smtClean="0"/>
               <a:t>The End</a:t>
             </a:r>
             <a:endParaRPr lang="en-US" dirty="0"/>
@@ -8022,23 +8097,7 @@
                 <a:cs typeface="Arial" panose="020B0604020202020204" pitchFamily="34" charset="0"/>
                 <a:hlinkClick r:id="rId3"/>
               </a:rPr>
-              <a:t>http</a:t>
-            </a:r>
-            <a:r>
-              <a:rPr lang="en-US" dirty="0" smtClean="0">
-                <a:latin typeface="Arial" panose="020B0604020202020204" pitchFamily="34" charset="0"/>
-                <a:cs typeface="Arial" panose="020B0604020202020204" pitchFamily="34" charset="0"/>
-                <a:hlinkClick r:id="rId3"/>
-              </a:rPr>
-              <a:t>://</a:t>
-            </a:r>
-            <a:r>
-              <a:rPr lang="en-US" dirty="0" smtClean="0">
-                <a:latin typeface="Arial" panose="020B0604020202020204" pitchFamily="34" charset="0"/>
-                <a:cs typeface="Arial" panose="020B0604020202020204" pitchFamily="34" charset="0"/>
-                <a:hlinkClick r:id="rId3"/>
-              </a:rPr>
-              <a:t>www.lispcast.com/java-learn-from-clojure</a:t>
+              <a:t>http://www.lispcast.com/java-learn-from-clojure</a:t>
             </a:r>
             <a:endParaRPr lang="en-US" dirty="0" smtClean="0">
               <a:latin typeface="Arial" panose="020B0604020202020204" pitchFamily="34" charset="0"/>
@@ -8143,11 +8202,7 @@
           <a:p>
             <a:r>
               <a:rPr lang="en-US" dirty="0" smtClean="0"/>
-              <a:t>State </a:t>
-            </a:r>
-            <a:r>
-              <a:rPr lang="en-US" dirty="0" smtClean="0"/>
-              <a:t>and Value</a:t>
+              <a:t>State and Value</a:t>
             </a:r>
           </a:p>
           <a:p>
@@ -8167,7 +8222,6 @@
               <a:rPr lang="en-US" dirty="0" smtClean="0"/>
               <a:t>Lambda</a:t>
             </a:r>
-            <a:endParaRPr lang="en-US" dirty="0" smtClean="0"/>
           </a:p>
           <a:p>
             <a:endParaRPr lang="en-US" dirty="0" smtClean="0"/>
@@ -9109,21 +9163,13 @@
           <a:p>
             <a:r>
               <a:rPr lang="en-US" dirty="0" smtClean="0"/>
-              <a:t>Use </a:t>
-            </a:r>
+              <a:t>Use Factories and Builders</a:t>
+            </a:r>
+          </a:p>
+          <a:p>
             <a:r>
               <a:rPr lang="en-US" dirty="0" smtClean="0"/>
-              <a:t>Factories and Builders</a:t>
-            </a:r>
-          </a:p>
-          <a:p>
-            <a:r>
-              <a:rPr lang="en-US" dirty="0" smtClean="0"/>
-              <a:t>Talk </a:t>
-            </a:r>
-            <a:r>
-              <a:rPr lang="en-US" dirty="0" smtClean="0"/>
-              <a:t>to abstractions</a:t>
+              <a:t>Talk to abstractions</a:t>
             </a:r>
           </a:p>
           <a:p>
@@ -9147,11 +9193,7 @@
             </a:pPr>
             <a:r>
               <a:rPr lang="en-US" i="1" baseline="0" dirty="0" smtClean="0"/>
-              <a:t>It is a conscious </a:t>
-            </a:r>
-            <a:r>
-              <a:rPr lang="en-US" i="1" baseline="0" dirty="0" smtClean="0"/>
-              <a:t>decision and work in Java</a:t>
+              <a:t>It is a conscious decision and work in Java</a:t>
             </a:r>
             <a:endParaRPr lang="en-US" i="1" dirty="0"/>
           </a:p>
@@ -9204,11 +9246,7 @@
           <a:p>
             <a:r>
               <a:rPr lang="en-US" dirty="0" smtClean="0"/>
-              <a:t>Using</a:t>
-            </a:r>
-            <a:r>
-              <a:rPr lang="en-US" baseline="0" dirty="0" smtClean="0"/>
-              <a:t> state and values</a:t>
+              <a:t>Immutable is hard</a:t>
             </a:r>
             <a:endParaRPr lang="en-US" dirty="0"/>
           </a:p>
@@ -9230,53 +9268,8 @@
           <a:lstStyle/>
           <a:p>
             <a:r>
-              <a:rPr lang="en-US" dirty="0" smtClean="0"/>
-              <a:t>Minimize and localize</a:t>
-            </a:r>
-            <a:r>
-              <a:rPr lang="en-US" baseline="0" dirty="0" smtClean="0"/>
-              <a:t> state</a:t>
-            </a:r>
-          </a:p>
-          <a:p>
-            <a:pPr lvl="1"/>
-            <a:r>
-              <a:rPr lang="en-US" baseline="0" dirty="0" smtClean="0"/>
-              <a:t>Centralize state – every object needs a value, not  </a:t>
-            </a:r>
-            <a:r>
-              <a:rPr lang="en-US" baseline="0" dirty="0" smtClean="0"/>
-              <a:t>state</a:t>
-            </a:r>
-          </a:p>
-          <a:p>
-            <a:pPr lvl="1"/>
-            <a:r>
-              <a:rPr lang="en-US" dirty="0" smtClean="0"/>
-              <a:t>Localize state – keep state in a method, do not let it escape</a:t>
-            </a:r>
-            <a:endParaRPr lang="en-US" baseline="0" dirty="0" smtClean="0"/>
-          </a:p>
-          <a:p>
-            <a:pPr lvl="1"/>
-            <a:r>
-              <a:rPr lang="en-US" baseline="0" dirty="0" smtClean="0"/>
-              <a:t>Façade </a:t>
-            </a:r>
-            <a:r>
-              <a:rPr lang="en-US" baseline="0" dirty="0" smtClean="0"/>
-              <a:t>pattern – make a state look like a</a:t>
-            </a:r>
-            <a:r>
-              <a:rPr lang="en-US" dirty="0" smtClean="0"/>
-              <a:t> value – it is only state if it actually changes</a:t>
-            </a:r>
-            <a:endParaRPr lang="en-US" baseline="0" dirty="0" smtClean="0"/>
-          </a:p>
-          <a:p>
-            <a:r>
-              <a:rPr lang="en-US" baseline="0" dirty="0" smtClean="0"/>
-              <a:t>Favor pure functions</a:t>
+              <a:rPr lang="en-US" dirty="0"/>
+              <a:t>http://codereview.stackexchange.com/questions/66629/immutable-objects-in-java</a:t>
             </a:r>
           </a:p>
         </p:txBody>
@@ -9284,7 +9277,7 @@
     </p:spTree>
     <p:extLst>
       <p:ext uri="{BB962C8B-B14F-4D97-AF65-F5344CB8AC3E}">
-        <p14:creationId xmlns:p14="http://schemas.microsoft.com/office/powerpoint/2010/main" val="2183352308"/>
+        <p14:creationId xmlns:p14="http://schemas.microsoft.com/office/powerpoint/2010/main" val="3167892073"/>
       </p:ext>
     </p:extLst>
   </p:cSld>

</xml_diff>